<commit_message>
WIP: Fix UseCases and Case Diagram
</commit_message>
<xml_diff>
--- a/Core/diagram.pptx
+++ b/Core/diagram.pptx
@@ -6,12 +6,13 @@
   </p:sldMasterIdLst>
   <p:sldIdLst>
     <p:sldId id="256" r:id="rId2"/>
-    <p:sldId id="257" r:id="rId3"/>
-    <p:sldId id="258" r:id="rId4"/>
-    <p:sldId id="259" r:id="rId5"/>
-    <p:sldId id="260" r:id="rId6"/>
-    <p:sldId id="261" r:id="rId7"/>
-    <p:sldId id="262" r:id="rId8"/>
+    <p:sldId id="263" r:id="rId3"/>
+    <p:sldId id="257" r:id="rId4"/>
+    <p:sldId id="258" r:id="rId5"/>
+    <p:sldId id="259" r:id="rId6"/>
+    <p:sldId id="260" r:id="rId7"/>
+    <p:sldId id="261" r:id="rId8"/>
+    <p:sldId id="262" r:id="rId9"/>
   </p:sldIdLst>
   <p:sldSz cx="12192000" cy="6858000"/>
   <p:notesSz cx="6858000" cy="9144000"/>
@@ -110,6 +111,11 @@
       </a:defRPr>
     </a:lvl9pPr>
   </p:defaultTextStyle>
+  <p:extLst>
+    <p:ext uri="{EFAFB233-063F-42B5-8137-9DF3F51BA10A}">
+      <p15:sldGuideLst xmlns:p15="http://schemas.microsoft.com/office/powerpoint/2012/main"/>
+    </p:ext>
+  </p:extLst>
 </p:presentation>
 </file>
 
@@ -260,7 +266,7 @@
           <a:p>
             <a:fld id="{91DB7CDC-93B0-4EB2-8E34-5DCEC40DFD21}" type="datetimeFigureOut">
               <a:rPr lang="ko-KR" altLang="en-US" smtClean="0"/>
-              <a:t>2021-04-21</a:t>
+              <a:t>2021. 4. 24.</a:t>
             </a:fld>
             <a:endParaRPr lang="ko-KR" altLang="en-US"/>
           </a:p>
@@ -458,7 +464,7 @@
           <a:p>
             <a:fld id="{91DB7CDC-93B0-4EB2-8E34-5DCEC40DFD21}" type="datetimeFigureOut">
               <a:rPr lang="ko-KR" altLang="en-US" smtClean="0"/>
-              <a:t>2021-04-21</a:t>
+              <a:t>2021. 4. 24.</a:t>
             </a:fld>
             <a:endParaRPr lang="ko-KR" altLang="en-US"/>
           </a:p>
@@ -666,7 +672,7 @@
           <a:p>
             <a:fld id="{91DB7CDC-93B0-4EB2-8E34-5DCEC40DFD21}" type="datetimeFigureOut">
               <a:rPr lang="ko-KR" altLang="en-US" smtClean="0"/>
-              <a:t>2021-04-21</a:t>
+              <a:t>2021. 4. 24.</a:t>
             </a:fld>
             <a:endParaRPr lang="ko-KR" altLang="en-US"/>
           </a:p>
@@ -864,7 +870,7 @@
           <a:p>
             <a:fld id="{91DB7CDC-93B0-4EB2-8E34-5DCEC40DFD21}" type="datetimeFigureOut">
               <a:rPr lang="ko-KR" altLang="en-US" smtClean="0"/>
-              <a:t>2021-04-21</a:t>
+              <a:t>2021. 4. 24.</a:t>
             </a:fld>
             <a:endParaRPr lang="ko-KR" altLang="en-US"/>
           </a:p>
@@ -1139,7 +1145,7 @@
           <a:p>
             <a:fld id="{91DB7CDC-93B0-4EB2-8E34-5DCEC40DFD21}" type="datetimeFigureOut">
               <a:rPr lang="ko-KR" altLang="en-US" smtClean="0"/>
-              <a:t>2021-04-21</a:t>
+              <a:t>2021. 4. 24.</a:t>
             </a:fld>
             <a:endParaRPr lang="ko-KR" altLang="en-US"/>
           </a:p>
@@ -1404,7 +1410,7 @@
           <a:p>
             <a:fld id="{91DB7CDC-93B0-4EB2-8E34-5DCEC40DFD21}" type="datetimeFigureOut">
               <a:rPr lang="ko-KR" altLang="en-US" smtClean="0"/>
-              <a:t>2021-04-21</a:t>
+              <a:t>2021. 4. 24.</a:t>
             </a:fld>
             <a:endParaRPr lang="ko-KR" altLang="en-US"/>
           </a:p>
@@ -1816,7 +1822,7 @@
           <a:p>
             <a:fld id="{91DB7CDC-93B0-4EB2-8E34-5DCEC40DFD21}" type="datetimeFigureOut">
               <a:rPr lang="ko-KR" altLang="en-US" smtClean="0"/>
-              <a:t>2021-04-21</a:t>
+              <a:t>2021. 4. 24.</a:t>
             </a:fld>
             <a:endParaRPr lang="ko-KR" altLang="en-US"/>
           </a:p>
@@ -1957,7 +1963,7 @@
           <a:p>
             <a:fld id="{91DB7CDC-93B0-4EB2-8E34-5DCEC40DFD21}" type="datetimeFigureOut">
               <a:rPr lang="ko-KR" altLang="en-US" smtClean="0"/>
-              <a:t>2021-04-21</a:t>
+              <a:t>2021. 4. 24.</a:t>
             </a:fld>
             <a:endParaRPr lang="ko-KR" altLang="en-US"/>
           </a:p>
@@ -2070,7 +2076,7 @@
           <a:p>
             <a:fld id="{91DB7CDC-93B0-4EB2-8E34-5DCEC40DFD21}" type="datetimeFigureOut">
               <a:rPr lang="ko-KR" altLang="en-US" smtClean="0"/>
-              <a:t>2021-04-21</a:t>
+              <a:t>2021. 4. 24.</a:t>
             </a:fld>
             <a:endParaRPr lang="ko-KR" altLang="en-US"/>
           </a:p>
@@ -2381,7 +2387,7 @@
           <a:p>
             <a:fld id="{91DB7CDC-93B0-4EB2-8E34-5DCEC40DFD21}" type="datetimeFigureOut">
               <a:rPr lang="ko-KR" altLang="en-US" smtClean="0"/>
-              <a:t>2021-04-21</a:t>
+              <a:t>2021. 4. 24.</a:t>
             </a:fld>
             <a:endParaRPr lang="ko-KR" altLang="en-US"/>
           </a:p>
@@ -2669,7 +2675,7 @@
           <a:p>
             <a:fld id="{91DB7CDC-93B0-4EB2-8E34-5DCEC40DFD21}" type="datetimeFigureOut">
               <a:rPr lang="ko-KR" altLang="en-US" smtClean="0"/>
-              <a:t>2021-04-21</a:t>
+              <a:t>2021. 4. 24.</a:t>
             </a:fld>
             <a:endParaRPr lang="ko-KR" altLang="en-US"/>
           </a:p>
@@ -2910,7 +2916,7 @@
           <a:p>
             <a:fld id="{91DB7CDC-93B0-4EB2-8E34-5DCEC40DFD21}" type="datetimeFigureOut">
               <a:rPr lang="ko-KR" altLang="en-US" smtClean="0"/>
-              <a:t>2021-04-21</a:t>
+              <a:t>2021. 4. 24.</a:t>
             </a:fld>
             <a:endParaRPr lang="ko-KR" altLang="en-US"/>
           </a:p>
@@ -3421,8 +3427,8 @@
         </p:nvSpPr>
         <p:spPr>
           <a:xfrm>
-            <a:off x="2761048" y="520505"/>
-            <a:ext cx="7481728" cy="5479366"/>
+            <a:off x="2761049" y="520505"/>
+            <a:ext cx="5958746" cy="5479366"/>
           </a:xfrm>
           <a:prstGeom prst="rect">
             <a:avLst/>
@@ -3474,7 +3480,7 @@
         <p:spPr>
           <a:xfrm>
             <a:off x="2822917" y="570846"/>
-            <a:ext cx="1679917" cy="374580"/>
+            <a:ext cx="3077140" cy="369332"/>
           </a:xfrm>
           <a:prstGeom prst="rect">
             <a:avLst/>
@@ -3518,9 +3524,9 @@
         <p:grpSpPr>
           <a:xfrm>
             <a:off x="355796" y="2331720"/>
-            <a:ext cx="1679917" cy="1783694"/>
+            <a:ext cx="1679917" cy="2055445"/>
             <a:chOff x="355796" y="2331720"/>
-            <a:chExt cx="1679917" cy="1783694"/>
+            <a:chExt cx="1679917" cy="2055445"/>
           </a:xfrm>
         </p:grpSpPr>
         <p:pic>
@@ -3577,7 +3583,7 @@
           <p:spPr>
             <a:xfrm>
               <a:off x="355796" y="3740834"/>
-              <a:ext cx="1679917" cy="374580"/>
+              <a:ext cx="1679917" cy="646331"/>
             </a:xfrm>
             <a:prstGeom prst="rect">
               <a:avLst/>
@@ -3604,6 +3610,1010 @@
                   <a:ea typeface="Microsoft GothicNeo" panose="020B0500000101010101" pitchFamily="50" charset="-127"/>
                   <a:cs typeface="Microsoft GothicNeo" panose="020B0500000101010101" pitchFamily="50" charset="-127"/>
                 </a:rPr>
+                <a:t>/</a:t>
+              </a:r>
+              <a:r>
+                <a:rPr lang="ko-KR" altLang="en-US" dirty="0">
+                  <a:latin typeface="Microsoft GothicNeo" panose="020B0500000101010101" pitchFamily="50" charset="-127"/>
+                  <a:ea typeface="Microsoft GothicNeo" panose="020B0500000101010101" pitchFamily="50" charset="-127"/>
+                  <a:cs typeface="Microsoft GothicNeo" panose="020B0500000101010101" pitchFamily="50" charset="-127"/>
+                </a:rPr>
+                <a:t>학생</a:t>
+              </a:r>
+              <a:r>
+                <a:rPr lang="en-US" altLang="ko-KR" dirty="0">
+                  <a:latin typeface="Microsoft GothicNeo" panose="020B0500000101010101" pitchFamily="50" charset="-127"/>
+                  <a:ea typeface="Microsoft GothicNeo" panose="020B0500000101010101" pitchFamily="50" charset="-127"/>
+                  <a:cs typeface="Microsoft GothicNeo" panose="020B0500000101010101" pitchFamily="50" charset="-127"/>
+                </a:rPr>
+                <a:t>(User)</a:t>
+              </a:r>
+              <a:endParaRPr lang="ko-KR" altLang="en-US" dirty="0">
+                <a:latin typeface="Microsoft GothicNeo" panose="020B0500000101010101" pitchFamily="50" charset="-127"/>
+                <a:ea typeface="Microsoft GothicNeo" panose="020B0500000101010101" pitchFamily="50" charset="-127"/>
+                <a:cs typeface="Microsoft GothicNeo" panose="020B0500000101010101" pitchFamily="50" charset="-127"/>
+              </a:endParaRPr>
+            </a:p>
+          </p:txBody>
+        </p:sp>
+      </p:grpSp>
+      <p:cxnSp>
+        <p:nvCxnSpPr>
+          <p:cNvPr id="18" name="직선 화살표 연결선 17">
+            <a:extLst>
+              <a:ext uri="{FF2B5EF4-FFF2-40B4-BE49-F238E27FC236}">
+                <a16:creationId xmlns:a16="http://schemas.microsoft.com/office/drawing/2014/main" id="{CB02DBCF-7E81-4CC4-87AD-D34EC69295B3}"/>
+              </a:ext>
+            </a:extLst>
+          </p:cNvPr>
+          <p:cNvCxnSpPr>
+            <a:cxnSpLocks/>
+            <a:endCxn id="22" idx="2"/>
+          </p:cNvCxnSpPr>
+          <p:nvPr/>
+        </p:nvCxnSpPr>
+        <p:spPr>
+          <a:xfrm>
+            <a:off x="1786597" y="3036277"/>
+            <a:ext cx="2813861" cy="51580"/>
+          </a:xfrm>
+          <a:prstGeom prst="straightConnector1">
+            <a:avLst/>
+          </a:prstGeom>
+          <a:ln>
+            <a:tailEnd type="triangle"/>
+          </a:ln>
+        </p:spPr>
+        <p:style>
+          <a:lnRef idx="1">
+            <a:schemeClr val="dk1"/>
+          </a:lnRef>
+          <a:fillRef idx="0">
+            <a:schemeClr val="dk1"/>
+          </a:fillRef>
+          <a:effectRef idx="0">
+            <a:schemeClr val="dk1"/>
+          </a:effectRef>
+          <a:fontRef idx="minor">
+            <a:schemeClr val="tx1"/>
+          </a:fontRef>
+        </p:style>
+      </p:cxnSp>
+      <p:sp>
+        <p:nvSpPr>
+          <p:cNvPr id="22" name="타원 21">
+            <a:extLst>
+              <a:ext uri="{FF2B5EF4-FFF2-40B4-BE49-F238E27FC236}">
+                <a16:creationId xmlns:a16="http://schemas.microsoft.com/office/drawing/2014/main" id="{4AD8EEF0-1A03-4B0F-89C6-FF97DCBF662A}"/>
+              </a:ext>
+            </a:extLst>
+          </p:cNvPr>
+          <p:cNvSpPr/>
+          <p:nvPr/>
+        </p:nvSpPr>
+        <p:spPr>
+          <a:xfrm>
+            <a:off x="4600458" y="2657034"/>
+            <a:ext cx="1730326" cy="861646"/>
+          </a:xfrm>
+          <a:prstGeom prst="ellipse">
+            <a:avLst/>
+          </a:prstGeom>
+          <a:solidFill>
+            <a:schemeClr val="tx2">
+              <a:lumMod val="40000"/>
+              <a:lumOff val="60000"/>
+            </a:schemeClr>
+          </a:solidFill>
+          <a:ln>
+            <a:solidFill>
+              <a:schemeClr val="tx1"/>
+            </a:solidFill>
+          </a:ln>
+        </p:spPr>
+        <p:style>
+          <a:lnRef idx="2">
+            <a:schemeClr val="accent1">
+              <a:shade val="50000"/>
+            </a:schemeClr>
+          </a:lnRef>
+          <a:fillRef idx="1">
+            <a:schemeClr val="accent1"/>
+          </a:fillRef>
+          <a:effectRef idx="0">
+            <a:schemeClr val="accent1"/>
+          </a:effectRef>
+          <a:fontRef idx="minor">
+            <a:schemeClr val="lt1"/>
+          </a:fontRef>
+        </p:style>
+        <p:txBody>
+          <a:bodyPr rtlCol="0" anchor="ctr"/>
+          <a:lstStyle/>
+          <a:p>
+            <a:pPr algn="ctr"/>
+            <a:r>
+              <a:rPr lang="en-US" altLang="ko-KR" b="1" dirty="0">
+                <a:solidFill>
+                  <a:schemeClr val="tx1"/>
+                </a:solidFill>
+                <a:effectLst/>
+              </a:rPr>
+              <a:t>Landing</a:t>
+            </a:r>
+          </a:p>
+          <a:p>
+            <a:pPr algn="ctr"/>
+            <a:r>
+              <a:rPr lang="en-US" altLang="ko-KR" b="1" dirty="0">
+                <a:solidFill>
+                  <a:schemeClr val="tx1"/>
+                </a:solidFill>
+                <a:effectLst/>
+              </a:rPr>
+              <a:t>(UC-0)</a:t>
+            </a:r>
+            <a:endParaRPr lang="ko-KR" altLang="en-US" b="1" dirty="0">
+              <a:solidFill>
+                <a:schemeClr val="tx1"/>
+              </a:solidFill>
+            </a:endParaRPr>
+          </a:p>
+        </p:txBody>
+      </p:sp>
+      <p:sp>
+        <p:nvSpPr>
+          <p:cNvPr id="42" name="TextBox 41">
+            <a:extLst>
+              <a:ext uri="{FF2B5EF4-FFF2-40B4-BE49-F238E27FC236}">
+                <a16:creationId xmlns:a16="http://schemas.microsoft.com/office/drawing/2014/main" id="{6E9260B5-2ED3-4CD7-AD3A-D5C36B992FA9}"/>
+              </a:ext>
+            </a:extLst>
+          </p:cNvPr>
+          <p:cNvSpPr txBox="1"/>
+          <p:nvPr/>
+        </p:nvSpPr>
+        <p:spPr>
+          <a:xfrm>
+            <a:off x="2875115" y="2755579"/>
+            <a:ext cx="1679917" cy="338554"/>
+          </a:xfrm>
+          <a:prstGeom prst="rect">
+            <a:avLst/>
+          </a:prstGeom>
+          <a:noFill/>
+        </p:spPr>
+        <p:txBody>
+          <a:bodyPr wrap="square">
+            <a:spAutoFit/>
+          </a:bodyPr>
+          <a:lstStyle/>
+          <a:p>
+            <a:r>
+              <a:rPr lang="en-US" altLang="ko-KR" sz="1600" dirty="0">
+                <a:latin typeface="Microsoft GothicNeo" panose="020B0500000101010101" pitchFamily="50" charset="-127"/>
+                <a:ea typeface="Microsoft GothicNeo" panose="020B0500000101010101" pitchFamily="50" charset="-127"/>
+                <a:cs typeface="Microsoft GothicNeo" panose="020B0500000101010101" pitchFamily="50" charset="-127"/>
+              </a:rPr>
+              <a:t>&lt;&lt;initiate&gt;&gt;</a:t>
+            </a:r>
+            <a:endParaRPr lang="ko-KR" altLang="en-US" sz="1600" dirty="0">
+              <a:latin typeface="Microsoft GothicNeo" panose="020B0500000101010101" pitchFamily="50" charset="-127"/>
+              <a:ea typeface="Microsoft GothicNeo" panose="020B0500000101010101" pitchFamily="50" charset="-127"/>
+              <a:cs typeface="Microsoft GothicNeo" panose="020B0500000101010101" pitchFamily="50" charset="-127"/>
+            </a:endParaRPr>
+          </a:p>
+        </p:txBody>
+      </p:sp>
+      <p:grpSp>
+        <p:nvGrpSpPr>
+          <p:cNvPr id="43" name="그룹 11">
+            <a:extLst>
+              <a:ext uri="{FF2B5EF4-FFF2-40B4-BE49-F238E27FC236}">
+                <a16:creationId xmlns:a16="http://schemas.microsoft.com/office/drawing/2014/main" id="{937A6CBE-C6F8-E64A-9406-3C21BCE55577}"/>
+              </a:ext>
+            </a:extLst>
+          </p:cNvPr>
+          <p:cNvGrpSpPr/>
+          <p:nvPr/>
+        </p:nvGrpSpPr>
+        <p:grpSpPr>
+          <a:xfrm>
+            <a:off x="9191207" y="4310436"/>
+            <a:ext cx="2032290" cy="1167586"/>
+            <a:chOff x="-613188" y="2331720"/>
+            <a:chExt cx="3610262" cy="2074158"/>
+          </a:xfrm>
+        </p:grpSpPr>
+        <p:pic>
+          <p:nvPicPr>
+            <p:cNvPr id="44" name="그래픽 4" descr="남자">
+              <a:extLst>
+                <a:ext uri="{FF2B5EF4-FFF2-40B4-BE49-F238E27FC236}">
+                  <a16:creationId xmlns:a16="http://schemas.microsoft.com/office/drawing/2014/main" id="{6D820334-097E-6A47-99EB-BFC79D003B3F}"/>
+                </a:ext>
+              </a:extLst>
+            </p:cNvPr>
+            <p:cNvPicPr>
+              <a:picLocks noChangeAspect="1"/>
+            </p:cNvPicPr>
+            <p:nvPr/>
+          </p:nvPicPr>
+          <p:blipFill>
+            <a:blip r:embed="rId2">
+              <a:extLst>
+                <a:ext uri="{28A0092B-C50C-407E-A947-70E740481C1C}">
+                  <a14:useLocalDpi xmlns:a14="http://schemas.microsoft.com/office/drawing/2010/main" val="0"/>
+                </a:ext>
+                <a:ext uri="{96DAC541-7B7A-43D3-8B79-37D633B846F1}">
+                  <asvg:svgBlip xmlns:asvg="http://schemas.microsoft.com/office/drawing/2016/SVG/main" r:embed="rId3"/>
+                </a:ext>
+              </a:extLst>
+            </a:blip>
+            <a:stretch>
+              <a:fillRect/>
+            </a:stretch>
+          </p:blipFill>
+          <p:spPr>
+            <a:xfrm>
+              <a:off x="377483" y="2331720"/>
+              <a:ext cx="1409114" cy="1409114"/>
+            </a:xfrm>
+            <a:prstGeom prst="rect">
+              <a:avLst/>
+            </a:prstGeom>
+          </p:spPr>
+        </p:pic>
+        <p:sp>
+          <p:nvSpPr>
+            <p:cNvPr id="45" name="TextBox 44">
+              <a:extLst>
+                <a:ext uri="{FF2B5EF4-FFF2-40B4-BE49-F238E27FC236}">
+                  <a16:creationId xmlns:a16="http://schemas.microsoft.com/office/drawing/2014/main" id="{CEA8D3F4-534B-4846-83CB-F4545B2676CE}"/>
+                </a:ext>
+              </a:extLst>
+            </p:cNvPr>
+            <p:cNvSpPr txBox="1"/>
+            <p:nvPr/>
+          </p:nvSpPr>
+          <p:spPr>
+            <a:xfrm>
+              <a:off x="-613188" y="3804454"/>
+              <a:ext cx="3610262" cy="601424"/>
+            </a:xfrm>
+            <a:prstGeom prst="rect">
+              <a:avLst/>
+            </a:prstGeom>
+            <a:noFill/>
+          </p:spPr>
+          <p:txBody>
+            <a:bodyPr wrap="square">
+              <a:spAutoFit/>
+            </a:bodyPr>
+            <a:lstStyle/>
+            <a:p>
+              <a:pPr algn="ctr"/>
+              <a:r>
+                <a:rPr lang="en-US" altLang="ko-KR" sz="1600" dirty="0">
+                  <a:latin typeface="Microsoft GothicNeo" panose="020B0500000101010101" pitchFamily="50" charset="-127"/>
+                  <a:ea typeface="Microsoft GothicNeo" panose="020B0500000101010101" pitchFamily="50" charset="-127"/>
+                  <a:cs typeface="Microsoft GothicNeo" panose="020B0500000101010101" pitchFamily="50" charset="-127"/>
+                </a:rPr>
+                <a:t>CDN</a:t>
+              </a:r>
+              <a:endParaRPr lang="ko-KR" altLang="en-US" sz="1600" dirty="0">
+                <a:latin typeface="Microsoft GothicNeo" panose="020B0500000101010101" pitchFamily="50" charset="-127"/>
+                <a:ea typeface="Microsoft GothicNeo" panose="020B0500000101010101" pitchFamily="50" charset="-127"/>
+                <a:cs typeface="Microsoft GothicNeo" panose="020B0500000101010101" pitchFamily="50" charset="-127"/>
+              </a:endParaRPr>
+            </a:p>
+          </p:txBody>
+        </p:sp>
+      </p:grpSp>
+      <p:cxnSp>
+        <p:nvCxnSpPr>
+          <p:cNvPr id="54" name="Straight Connector 53">
+            <a:extLst>
+              <a:ext uri="{FF2B5EF4-FFF2-40B4-BE49-F238E27FC236}">
+                <a16:creationId xmlns:a16="http://schemas.microsoft.com/office/drawing/2014/main" id="{617B2E82-87E7-A144-A0D5-3D5A47DD622D}"/>
+              </a:ext>
+            </a:extLst>
+          </p:cNvPr>
+          <p:cNvCxnSpPr>
+            <a:cxnSpLocks/>
+            <a:stCxn id="22" idx="6"/>
+          </p:cNvCxnSpPr>
+          <p:nvPr/>
+        </p:nvCxnSpPr>
+        <p:spPr>
+          <a:xfrm flipV="1">
+            <a:off x="6330784" y="1583703"/>
+            <a:ext cx="3407105" cy="1504154"/>
+          </a:xfrm>
+          <a:prstGeom prst="line">
+            <a:avLst/>
+          </a:prstGeom>
+        </p:spPr>
+        <p:style>
+          <a:lnRef idx="1">
+            <a:schemeClr val="dk1"/>
+          </a:lnRef>
+          <a:fillRef idx="0">
+            <a:schemeClr val="dk1"/>
+          </a:fillRef>
+          <a:effectRef idx="0">
+            <a:schemeClr val="dk1"/>
+          </a:effectRef>
+          <a:fontRef idx="minor">
+            <a:schemeClr val="tx1"/>
+          </a:fontRef>
+        </p:style>
+      </p:cxnSp>
+      <p:sp>
+        <p:nvSpPr>
+          <p:cNvPr id="55" name="TextBox 54">
+            <a:extLst>
+              <a:ext uri="{FF2B5EF4-FFF2-40B4-BE49-F238E27FC236}">
+                <a16:creationId xmlns:a16="http://schemas.microsoft.com/office/drawing/2014/main" id="{B6A69A00-7AA5-BE44-9637-3D9A897BFB54}"/>
+              </a:ext>
+            </a:extLst>
+          </p:cNvPr>
+          <p:cNvSpPr txBox="1"/>
+          <p:nvPr/>
+        </p:nvSpPr>
+        <p:spPr>
+          <a:xfrm rot="1744793">
+            <a:off x="6980076" y="3697071"/>
+            <a:ext cx="1892192" cy="338554"/>
+          </a:xfrm>
+          <a:prstGeom prst="rect">
+            <a:avLst/>
+          </a:prstGeom>
+          <a:noFill/>
+        </p:spPr>
+        <p:txBody>
+          <a:bodyPr wrap="square">
+            <a:spAutoFit/>
+          </a:bodyPr>
+          <a:lstStyle/>
+          <a:p>
+            <a:r>
+              <a:rPr lang="en-US" altLang="ko-KR" sz="1600" dirty="0">
+                <a:latin typeface="Microsoft GothicNeo" panose="020B0500000101010101" pitchFamily="50" charset="-127"/>
+                <a:ea typeface="Microsoft GothicNeo" panose="020B0500000101010101" pitchFamily="50" charset="-127"/>
+                <a:cs typeface="Microsoft GothicNeo" panose="020B0500000101010101" pitchFamily="50" charset="-127"/>
+              </a:rPr>
+              <a:t>&lt;&lt;participate&gt;&gt;</a:t>
+            </a:r>
+            <a:endParaRPr lang="ko-KR" altLang="en-US" sz="1600" dirty="0">
+              <a:latin typeface="Microsoft GothicNeo" panose="020B0500000101010101" pitchFamily="50" charset="-127"/>
+              <a:ea typeface="Microsoft GothicNeo" panose="020B0500000101010101" pitchFamily="50" charset="-127"/>
+              <a:cs typeface="Microsoft GothicNeo" panose="020B0500000101010101" pitchFamily="50" charset="-127"/>
+            </a:endParaRPr>
+          </a:p>
+        </p:txBody>
+      </p:sp>
+      <p:cxnSp>
+        <p:nvCxnSpPr>
+          <p:cNvPr id="56" name="Straight Connector 55">
+            <a:extLst>
+              <a:ext uri="{FF2B5EF4-FFF2-40B4-BE49-F238E27FC236}">
+                <a16:creationId xmlns:a16="http://schemas.microsoft.com/office/drawing/2014/main" id="{31CA6B91-1F5F-5942-9035-9858235F9833}"/>
+              </a:ext>
+            </a:extLst>
+          </p:cNvPr>
+          <p:cNvCxnSpPr>
+            <a:cxnSpLocks/>
+          </p:cNvCxnSpPr>
+          <p:nvPr/>
+        </p:nvCxnSpPr>
+        <p:spPr>
+          <a:xfrm>
+            <a:off x="6331029" y="3083873"/>
+            <a:ext cx="3190288" cy="1872299"/>
+          </a:xfrm>
+          <a:prstGeom prst="line">
+            <a:avLst/>
+          </a:prstGeom>
+        </p:spPr>
+        <p:style>
+          <a:lnRef idx="1">
+            <a:schemeClr val="dk1"/>
+          </a:lnRef>
+          <a:fillRef idx="0">
+            <a:schemeClr val="dk1"/>
+          </a:fillRef>
+          <a:effectRef idx="0">
+            <a:schemeClr val="dk1"/>
+          </a:effectRef>
+          <a:fontRef idx="minor">
+            <a:schemeClr val="tx1"/>
+          </a:fontRef>
+        </p:style>
+      </p:cxnSp>
+      <p:grpSp>
+        <p:nvGrpSpPr>
+          <p:cNvPr id="57" name="그룹 11">
+            <a:extLst>
+              <a:ext uri="{FF2B5EF4-FFF2-40B4-BE49-F238E27FC236}">
+                <a16:creationId xmlns:a16="http://schemas.microsoft.com/office/drawing/2014/main" id="{6B4F6E4E-C1AF-4C44-A809-18A8FA103306}"/>
+              </a:ext>
+            </a:extLst>
+          </p:cNvPr>
+          <p:cNvGrpSpPr/>
+          <p:nvPr/>
+        </p:nvGrpSpPr>
+        <p:grpSpPr>
+          <a:xfrm>
+            <a:off x="9737889" y="940178"/>
+            <a:ext cx="1603044" cy="1377994"/>
+            <a:chOff x="-146220" y="2331720"/>
+            <a:chExt cx="2847728" cy="2447938"/>
+          </a:xfrm>
+        </p:grpSpPr>
+        <p:pic>
+          <p:nvPicPr>
+            <p:cNvPr id="58" name="그래픽 4" descr="남자">
+              <a:extLst>
+                <a:ext uri="{FF2B5EF4-FFF2-40B4-BE49-F238E27FC236}">
+                  <a16:creationId xmlns:a16="http://schemas.microsoft.com/office/drawing/2014/main" id="{B4BAD2CC-57FD-2348-9151-0374A5708929}"/>
+                </a:ext>
+              </a:extLst>
+            </p:cNvPr>
+            <p:cNvPicPr>
+              <a:picLocks noChangeAspect="1"/>
+            </p:cNvPicPr>
+            <p:nvPr/>
+          </p:nvPicPr>
+          <p:blipFill>
+            <a:blip r:embed="rId2">
+              <a:extLst>
+                <a:ext uri="{28A0092B-C50C-407E-A947-70E740481C1C}">
+                  <a14:useLocalDpi xmlns:a14="http://schemas.microsoft.com/office/drawing/2010/main" val="0"/>
+                </a:ext>
+                <a:ext uri="{96DAC541-7B7A-43D3-8B79-37D633B846F1}">
+                  <asvg:svgBlip xmlns:asvg="http://schemas.microsoft.com/office/drawing/2016/SVG/main" r:embed="rId3"/>
+                </a:ext>
+              </a:extLst>
+            </a:blip>
+            <a:stretch>
+              <a:fillRect/>
+            </a:stretch>
+          </p:blipFill>
+          <p:spPr>
+            <a:xfrm>
+              <a:off x="377483" y="2331720"/>
+              <a:ext cx="1409114" cy="1409114"/>
+            </a:xfrm>
+            <a:prstGeom prst="rect">
+              <a:avLst/>
+            </a:prstGeom>
+          </p:spPr>
+        </p:pic>
+        <p:sp>
+          <p:nvSpPr>
+            <p:cNvPr id="62" name="TextBox 61">
+              <a:extLst>
+                <a:ext uri="{FF2B5EF4-FFF2-40B4-BE49-F238E27FC236}">
+                  <a16:creationId xmlns:a16="http://schemas.microsoft.com/office/drawing/2014/main" id="{5B7D0A30-FF7F-B740-AF9B-835A16E8F662}"/>
+                </a:ext>
+              </a:extLst>
+            </p:cNvPr>
+            <p:cNvSpPr txBox="1"/>
+            <p:nvPr/>
+          </p:nvSpPr>
+          <p:spPr>
+            <a:xfrm>
+              <a:off x="-146220" y="3740834"/>
+              <a:ext cx="2847728" cy="1038824"/>
+            </a:xfrm>
+            <a:prstGeom prst="rect">
+              <a:avLst/>
+            </a:prstGeom>
+            <a:noFill/>
+          </p:spPr>
+          <p:txBody>
+            <a:bodyPr wrap="square">
+              <a:spAutoFit/>
+            </a:bodyPr>
+            <a:lstStyle/>
+            <a:p>
+              <a:pPr algn="ctr"/>
+              <a:r>
+                <a:rPr lang="en-US" altLang="ko-KR" sz="1600" dirty="0">
+                  <a:latin typeface="Microsoft GothicNeo" panose="020B0500000101010101" pitchFamily="50" charset="-127"/>
+                  <a:ea typeface="Microsoft GothicNeo" panose="020B0500000101010101" pitchFamily="50" charset="-127"/>
+                  <a:cs typeface="Microsoft GothicNeo" panose="020B0500000101010101" pitchFamily="50" charset="-127"/>
+                </a:rPr>
+                <a:t>Authentication</a:t>
+              </a:r>
+            </a:p>
+            <a:p>
+              <a:pPr algn="ctr"/>
+              <a:r>
+                <a:rPr lang="en-US" altLang="ko-KR" sz="1600" dirty="0">
+                  <a:latin typeface="Microsoft GothicNeo" panose="020B0500000101010101" pitchFamily="50" charset="-127"/>
+                  <a:ea typeface="Microsoft GothicNeo" panose="020B0500000101010101" pitchFamily="50" charset="-127"/>
+                  <a:cs typeface="Microsoft GothicNeo" panose="020B0500000101010101" pitchFamily="50" charset="-127"/>
+                </a:rPr>
+                <a:t>Service</a:t>
+              </a:r>
+              <a:endParaRPr lang="ko-KR" altLang="en-US" sz="1600" dirty="0">
+                <a:latin typeface="Microsoft GothicNeo" panose="020B0500000101010101" pitchFamily="50" charset="-127"/>
+                <a:ea typeface="Microsoft GothicNeo" panose="020B0500000101010101" pitchFamily="50" charset="-127"/>
+                <a:cs typeface="Microsoft GothicNeo" panose="020B0500000101010101" pitchFamily="50" charset="-127"/>
+              </a:endParaRPr>
+            </a:p>
+          </p:txBody>
+        </p:sp>
+      </p:grpSp>
+      <p:sp>
+        <p:nvSpPr>
+          <p:cNvPr id="63" name="TextBox 62">
+            <a:extLst>
+              <a:ext uri="{FF2B5EF4-FFF2-40B4-BE49-F238E27FC236}">
+                <a16:creationId xmlns:a16="http://schemas.microsoft.com/office/drawing/2014/main" id="{D0CC3837-7EE7-614B-AD54-71DBFE4C4CF5}"/>
+              </a:ext>
+            </a:extLst>
+          </p:cNvPr>
+          <p:cNvSpPr txBox="1"/>
+          <p:nvPr/>
+        </p:nvSpPr>
+        <p:spPr>
+          <a:xfrm rot="20189872">
+            <a:off x="7098804" y="1960166"/>
+            <a:ext cx="1892192" cy="338554"/>
+          </a:xfrm>
+          <a:prstGeom prst="rect">
+            <a:avLst/>
+          </a:prstGeom>
+          <a:noFill/>
+        </p:spPr>
+        <p:txBody>
+          <a:bodyPr wrap="square">
+            <a:spAutoFit/>
+          </a:bodyPr>
+          <a:lstStyle/>
+          <a:p>
+            <a:r>
+              <a:rPr lang="en-US" altLang="ko-KR" sz="1600" dirty="0">
+                <a:latin typeface="Microsoft GothicNeo" panose="020B0500000101010101" pitchFamily="50" charset="-127"/>
+                <a:ea typeface="Microsoft GothicNeo" panose="020B0500000101010101" pitchFamily="50" charset="-127"/>
+                <a:cs typeface="Microsoft GothicNeo" panose="020B0500000101010101" pitchFamily="50" charset="-127"/>
+              </a:rPr>
+              <a:t>&lt;&lt;participate&gt;&gt;</a:t>
+            </a:r>
+            <a:endParaRPr lang="ko-KR" altLang="en-US" sz="1600" dirty="0">
+              <a:latin typeface="Microsoft GothicNeo" panose="020B0500000101010101" pitchFamily="50" charset="-127"/>
+              <a:ea typeface="Microsoft GothicNeo" panose="020B0500000101010101" pitchFamily="50" charset="-127"/>
+              <a:cs typeface="Microsoft GothicNeo" panose="020B0500000101010101" pitchFamily="50" charset="-127"/>
+            </a:endParaRPr>
+          </a:p>
+        </p:txBody>
+      </p:sp>
+      <p:sp>
+        <p:nvSpPr>
+          <p:cNvPr id="66" name="타원 21">
+            <a:extLst>
+              <a:ext uri="{FF2B5EF4-FFF2-40B4-BE49-F238E27FC236}">
+                <a16:creationId xmlns:a16="http://schemas.microsoft.com/office/drawing/2014/main" id="{6FF77B1A-2FD5-F74B-9D85-F4498558A2BA}"/>
+              </a:ext>
+            </a:extLst>
+          </p:cNvPr>
+          <p:cNvSpPr/>
+          <p:nvPr/>
+        </p:nvSpPr>
+        <p:spPr>
+          <a:xfrm>
+            <a:off x="4169524" y="4843474"/>
+            <a:ext cx="2592194" cy="861646"/>
+          </a:xfrm>
+          <a:prstGeom prst="ellipse">
+            <a:avLst/>
+          </a:prstGeom>
+          <a:solidFill>
+            <a:schemeClr val="tx2">
+              <a:lumMod val="40000"/>
+              <a:lumOff val="60000"/>
+            </a:schemeClr>
+          </a:solidFill>
+          <a:ln>
+            <a:solidFill>
+              <a:schemeClr val="tx1"/>
+            </a:solidFill>
+          </a:ln>
+        </p:spPr>
+        <p:style>
+          <a:lnRef idx="2">
+            <a:schemeClr val="accent1">
+              <a:shade val="50000"/>
+            </a:schemeClr>
+          </a:lnRef>
+          <a:fillRef idx="1">
+            <a:schemeClr val="accent1"/>
+          </a:fillRef>
+          <a:effectRef idx="0">
+            <a:schemeClr val="accent1"/>
+          </a:effectRef>
+          <a:fontRef idx="minor">
+            <a:schemeClr val="lt1"/>
+          </a:fontRef>
+        </p:style>
+        <p:txBody>
+          <a:bodyPr rtlCol="0" anchor="ctr"/>
+          <a:lstStyle/>
+          <a:p>
+            <a:pPr algn="ctr"/>
+            <a:r>
+              <a:rPr lang="en-US" altLang="ko-KR" b="1" dirty="0">
+                <a:solidFill>
+                  <a:schemeClr val="tx1"/>
+                </a:solidFill>
+              </a:rPr>
+              <a:t>Every Other Use Case</a:t>
+            </a:r>
+            <a:endParaRPr lang="en-US" altLang="ko-KR" b="1" dirty="0">
+              <a:solidFill>
+                <a:schemeClr val="tx1"/>
+              </a:solidFill>
+              <a:effectLst/>
+            </a:endParaRPr>
+          </a:p>
+          <a:p>
+            <a:pPr algn="ctr"/>
+            <a:r>
+              <a:rPr lang="en-US" altLang="ko-KR" b="1" dirty="0">
+                <a:solidFill>
+                  <a:schemeClr val="tx1"/>
+                </a:solidFill>
+                <a:effectLst/>
+              </a:rPr>
+              <a:t>(UC-XX)</a:t>
+            </a:r>
+            <a:endParaRPr lang="ko-KR" altLang="en-US" b="1" dirty="0">
+              <a:solidFill>
+                <a:schemeClr val="tx1"/>
+              </a:solidFill>
+            </a:endParaRPr>
+          </a:p>
+        </p:txBody>
+      </p:sp>
+      <p:cxnSp>
+        <p:nvCxnSpPr>
+          <p:cNvPr id="69" name="직선 화살표 연결선 30">
+            <a:extLst>
+              <a:ext uri="{FF2B5EF4-FFF2-40B4-BE49-F238E27FC236}">
+                <a16:creationId xmlns:a16="http://schemas.microsoft.com/office/drawing/2014/main" id="{64191EB2-6293-BC4E-8956-BE0AB0855E49}"/>
+              </a:ext>
+            </a:extLst>
+          </p:cNvPr>
+          <p:cNvCxnSpPr>
+            <a:cxnSpLocks/>
+            <a:stCxn id="66" idx="0"/>
+            <a:endCxn id="22" idx="4"/>
+          </p:cNvCxnSpPr>
+          <p:nvPr/>
+        </p:nvCxnSpPr>
+        <p:spPr>
+          <a:xfrm rot="5400000" flipH="1" flipV="1">
+            <a:off x="4803224" y="4181077"/>
+            <a:ext cx="1324794" cy="12700"/>
+          </a:xfrm>
+          <a:prstGeom prst="bentConnector3">
+            <a:avLst>
+              <a:gd name="adj1" fmla="val 50000"/>
+            </a:avLst>
+          </a:prstGeom>
+          <a:ln w="19050">
+            <a:solidFill>
+              <a:schemeClr val="tx1"/>
+            </a:solidFill>
+            <a:prstDash val="dash"/>
+            <a:tailEnd type="triangle"/>
+          </a:ln>
+        </p:spPr>
+        <p:style>
+          <a:lnRef idx="1">
+            <a:schemeClr val="accent1"/>
+          </a:lnRef>
+          <a:fillRef idx="0">
+            <a:schemeClr val="accent1"/>
+          </a:fillRef>
+          <a:effectRef idx="0">
+            <a:schemeClr val="accent1"/>
+          </a:effectRef>
+          <a:fontRef idx="minor">
+            <a:schemeClr val="tx1"/>
+          </a:fontRef>
+        </p:style>
+      </p:cxnSp>
+      <p:sp>
+        <p:nvSpPr>
+          <p:cNvPr id="70" name="TextBox 69">
+            <a:extLst>
+              <a:ext uri="{FF2B5EF4-FFF2-40B4-BE49-F238E27FC236}">
+                <a16:creationId xmlns:a16="http://schemas.microsoft.com/office/drawing/2014/main" id="{20ACE4C4-2DA2-574A-8F49-691E65709C32}"/>
+              </a:ext>
+            </a:extLst>
+          </p:cNvPr>
+          <p:cNvSpPr txBox="1"/>
+          <p:nvPr/>
+        </p:nvSpPr>
+        <p:spPr>
+          <a:xfrm rot="16200000">
+            <a:off x="4644416" y="3959019"/>
+            <a:ext cx="1337038" cy="276999"/>
+          </a:xfrm>
+          <a:prstGeom prst="rect">
+            <a:avLst/>
+          </a:prstGeom>
+          <a:noFill/>
+        </p:spPr>
+        <p:txBody>
+          <a:bodyPr wrap="square">
+            <a:spAutoFit/>
+          </a:bodyPr>
+          <a:lstStyle/>
+          <a:p>
+            <a:r>
+              <a:rPr lang="en-US" altLang="ko-KR" sz="1200" dirty="0">
+                <a:latin typeface="Microsoft GothicNeo" panose="020B0500000101010101" pitchFamily="50" charset="-127"/>
+                <a:ea typeface="Microsoft GothicNeo" panose="020B0500000101010101" pitchFamily="50" charset="-127"/>
+                <a:cs typeface="Microsoft GothicNeo" panose="020B0500000101010101" pitchFamily="50" charset="-127"/>
+              </a:rPr>
+              <a:t>&lt;&lt;include&gt;&gt;</a:t>
+            </a:r>
+            <a:endParaRPr lang="ko-KR" altLang="en-US" sz="1200" dirty="0">
+              <a:latin typeface="Microsoft GothicNeo" panose="020B0500000101010101" pitchFamily="50" charset="-127"/>
+              <a:ea typeface="Microsoft GothicNeo" panose="020B0500000101010101" pitchFamily="50" charset="-127"/>
+              <a:cs typeface="Microsoft GothicNeo" panose="020B0500000101010101" pitchFamily="50" charset="-127"/>
+            </a:endParaRPr>
+          </a:p>
+        </p:txBody>
+      </p:sp>
+    </p:spTree>
+    <p:extLst>
+      <p:ext uri="{BB962C8B-B14F-4D97-AF65-F5344CB8AC3E}">
+        <p14:creationId xmlns:p14="http://schemas.microsoft.com/office/powerpoint/2010/main" val="166036346"/>
+      </p:ext>
+    </p:extLst>
+  </p:cSld>
+  <p:clrMapOvr>
+    <a:masterClrMapping/>
+  </p:clrMapOvr>
+</p:sld>
+</file>
+
+<file path=ppt/slides/slide3.xml><?xml version="1.0" encoding="utf-8"?>
+<p:sld xmlns:a="http://schemas.openxmlformats.org/drawingml/2006/main" xmlns:r="http://schemas.openxmlformats.org/officeDocument/2006/relationships" xmlns:p="http://schemas.openxmlformats.org/presentationml/2006/main">
+  <p:cSld>
+    <p:spTree>
+      <p:nvGrpSpPr>
+        <p:cNvPr id="1" name=""/>
+        <p:cNvGrpSpPr/>
+        <p:nvPr/>
+      </p:nvGrpSpPr>
+      <p:grpSpPr>
+        <a:xfrm>
+          <a:off x="0" y="0"/>
+          <a:ext cx="0" cy="0"/>
+          <a:chOff x="0" y="0"/>
+          <a:chExt cx="0" cy="0"/>
+        </a:xfrm>
+      </p:grpSpPr>
+      <p:sp>
+        <p:nvSpPr>
+          <p:cNvPr id="6" name="직사각형 5">
+            <a:extLst>
+              <a:ext uri="{FF2B5EF4-FFF2-40B4-BE49-F238E27FC236}">
+                <a16:creationId xmlns:a16="http://schemas.microsoft.com/office/drawing/2014/main" id="{7916ABD5-C894-46DC-812B-4D400F66AE59}"/>
+              </a:ext>
+            </a:extLst>
+          </p:cNvPr>
+          <p:cNvSpPr/>
+          <p:nvPr/>
+        </p:nvSpPr>
+        <p:spPr>
+          <a:xfrm>
+            <a:off x="2761048" y="520505"/>
+            <a:ext cx="6918211" cy="5479366"/>
+          </a:xfrm>
+          <a:prstGeom prst="rect">
+            <a:avLst/>
+          </a:prstGeom>
+          <a:noFill/>
+          <a:ln w="28575">
+            <a:solidFill>
+              <a:schemeClr val="tx1"/>
+            </a:solidFill>
+          </a:ln>
+        </p:spPr>
+        <p:style>
+          <a:lnRef idx="2">
+            <a:schemeClr val="accent1">
+              <a:shade val="50000"/>
+            </a:schemeClr>
+          </a:lnRef>
+          <a:fillRef idx="1">
+            <a:schemeClr val="accent1"/>
+          </a:fillRef>
+          <a:effectRef idx="0">
+            <a:schemeClr val="accent1"/>
+          </a:effectRef>
+          <a:fontRef idx="minor">
+            <a:schemeClr val="lt1"/>
+          </a:fontRef>
+        </p:style>
+        <p:txBody>
+          <a:bodyPr rtlCol="0" anchor="ctr"/>
+          <a:lstStyle/>
+          <a:p>
+            <a:pPr algn="ctr"/>
+            <a:endParaRPr lang="ko-KR" altLang="en-US"/>
+          </a:p>
+        </p:txBody>
+      </p:sp>
+      <p:sp>
+        <p:nvSpPr>
+          <p:cNvPr id="10" name="TextBox 9">
+            <a:extLst>
+              <a:ext uri="{FF2B5EF4-FFF2-40B4-BE49-F238E27FC236}">
+                <a16:creationId xmlns:a16="http://schemas.microsoft.com/office/drawing/2014/main" id="{B09F4F48-722A-4B1E-8684-3E9BAED011C6}"/>
+              </a:ext>
+            </a:extLst>
+          </p:cNvPr>
+          <p:cNvSpPr txBox="1"/>
+          <p:nvPr/>
+        </p:nvSpPr>
+        <p:spPr>
+          <a:xfrm>
+            <a:off x="2822917" y="570846"/>
+            <a:ext cx="3077140" cy="369332"/>
+          </a:xfrm>
+          <a:prstGeom prst="rect">
+            <a:avLst/>
+          </a:prstGeom>
+          <a:noFill/>
+        </p:spPr>
+        <p:txBody>
+          <a:bodyPr wrap="square">
+            <a:spAutoFit/>
+          </a:bodyPr>
+          <a:lstStyle/>
+          <a:p>
+            <a:r>
+              <a:rPr lang="en-US" altLang="ko-KR" dirty="0">
+                <a:latin typeface="Microsoft GothicNeo" panose="020B0500000101010101" pitchFamily="50" charset="-127"/>
+                <a:ea typeface="Microsoft GothicNeo" panose="020B0500000101010101" pitchFamily="50" charset="-127"/>
+                <a:cs typeface="Microsoft GothicNeo" panose="020B0500000101010101" pitchFamily="50" charset="-127"/>
+              </a:rPr>
+              <a:t>User Sub System</a:t>
+            </a:r>
+            <a:endParaRPr lang="ko-KR" altLang="en-US" dirty="0">
+              <a:latin typeface="Microsoft GothicNeo" panose="020B0500000101010101" pitchFamily="50" charset="-127"/>
+              <a:ea typeface="Microsoft GothicNeo" panose="020B0500000101010101" pitchFamily="50" charset="-127"/>
+              <a:cs typeface="Microsoft GothicNeo" panose="020B0500000101010101" pitchFamily="50" charset="-127"/>
+            </a:endParaRPr>
+          </a:p>
+        </p:txBody>
+      </p:sp>
+      <p:grpSp>
+        <p:nvGrpSpPr>
+          <p:cNvPr id="12" name="그룹 11">
+            <a:extLst>
+              <a:ext uri="{FF2B5EF4-FFF2-40B4-BE49-F238E27FC236}">
+                <a16:creationId xmlns:a16="http://schemas.microsoft.com/office/drawing/2014/main" id="{4AA437EE-6C7D-4C91-B597-62484DFC288F}"/>
+              </a:ext>
+            </a:extLst>
+          </p:cNvPr>
+          <p:cNvGrpSpPr/>
+          <p:nvPr/>
+        </p:nvGrpSpPr>
+        <p:grpSpPr>
+          <a:xfrm>
+            <a:off x="355796" y="2331720"/>
+            <a:ext cx="1679917" cy="2055445"/>
+            <a:chOff x="355796" y="2331720"/>
+            <a:chExt cx="1679917" cy="2055445"/>
+          </a:xfrm>
+        </p:grpSpPr>
+        <p:pic>
+          <p:nvPicPr>
+            <p:cNvPr id="5" name="그래픽 4" descr="남자">
+              <a:extLst>
+                <a:ext uri="{FF2B5EF4-FFF2-40B4-BE49-F238E27FC236}">
+                  <a16:creationId xmlns:a16="http://schemas.microsoft.com/office/drawing/2014/main" id="{390B1539-40DF-4855-9DFA-6B0F5BA15E6E}"/>
+                </a:ext>
+              </a:extLst>
+            </p:cNvPr>
+            <p:cNvPicPr>
+              <a:picLocks noChangeAspect="1"/>
+            </p:cNvPicPr>
+            <p:nvPr/>
+          </p:nvPicPr>
+          <p:blipFill>
+            <a:blip r:embed="rId2">
+              <a:extLst>
+                <a:ext uri="{28A0092B-C50C-407E-A947-70E740481C1C}">
+                  <a14:useLocalDpi xmlns:a14="http://schemas.microsoft.com/office/drawing/2010/main" val="0"/>
+                </a:ext>
+                <a:ext uri="{96DAC541-7B7A-43D3-8B79-37D633B846F1}">
+                  <asvg:svgBlip xmlns:asvg="http://schemas.microsoft.com/office/drawing/2016/SVG/main" r:embed="rId3"/>
+                </a:ext>
+              </a:extLst>
+            </a:blip>
+            <a:stretch>
+              <a:fillRect/>
+            </a:stretch>
+          </p:blipFill>
+          <p:spPr>
+            <a:xfrm>
+              <a:off x="377483" y="2331720"/>
+              <a:ext cx="1409114" cy="1409114"/>
+            </a:xfrm>
+            <a:prstGeom prst="rect">
+              <a:avLst/>
+            </a:prstGeom>
+          </p:spPr>
+        </p:pic>
+        <p:sp>
+          <p:nvSpPr>
+            <p:cNvPr id="11" name="TextBox 10">
+              <a:extLst>
+                <a:ext uri="{FF2B5EF4-FFF2-40B4-BE49-F238E27FC236}">
+                  <a16:creationId xmlns:a16="http://schemas.microsoft.com/office/drawing/2014/main" id="{BA3C04BE-8E8D-4659-AE38-9B486D128A0C}"/>
+                </a:ext>
+              </a:extLst>
+            </p:cNvPr>
+            <p:cNvSpPr txBox="1"/>
+            <p:nvPr/>
+          </p:nvSpPr>
+          <p:spPr>
+            <a:xfrm>
+              <a:off x="355796" y="3740834"/>
+              <a:ext cx="1679917" cy="646331"/>
+            </a:xfrm>
+            <a:prstGeom prst="rect">
+              <a:avLst/>
+            </a:prstGeom>
+            <a:noFill/>
+          </p:spPr>
+          <p:txBody>
+            <a:bodyPr wrap="square">
+              <a:spAutoFit/>
+            </a:bodyPr>
+            <a:lstStyle/>
+            <a:p>
+              <a:r>
+                <a:rPr lang="ko-KR" altLang="en-US" dirty="0">
+                  <a:latin typeface="Microsoft GothicNeo" panose="020B0500000101010101" pitchFamily="50" charset="-127"/>
+                  <a:ea typeface="Microsoft GothicNeo" panose="020B0500000101010101" pitchFamily="50" charset="-127"/>
+                  <a:cs typeface="Microsoft GothicNeo" panose="020B0500000101010101" pitchFamily="50" charset="-127"/>
+                </a:rPr>
+                <a:t>교수자</a:t>
+              </a:r>
+              <a:r>
+                <a:rPr lang="en-US" altLang="ko-KR" dirty="0">
+                  <a:latin typeface="Microsoft GothicNeo" panose="020B0500000101010101" pitchFamily="50" charset="-127"/>
+                  <a:ea typeface="Microsoft GothicNeo" panose="020B0500000101010101" pitchFamily="50" charset="-127"/>
+                  <a:cs typeface="Microsoft GothicNeo" panose="020B0500000101010101" pitchFamily="50" charset="-127"/>
+                </a:rPr>
+                <a:t>/</a:t>
+              </a:r>
+              <a:r>
+                <a:rPr lang="ko-KR" altLang="en-US" dirty="0">
+                  <a:latin typeface="Microsoft GothicNeo" panose="020B0500000101010101" pitchFamily="50" charset="-127"/>
+                  <a:ea typeface="Microsoft GothicNeo" panose="020B0500000101010101" pitchFamily="50" charset="-127"/>
+                  <a:cs typeface="Microsoft GothicNeo" panose="020B0500000101010101" pitchFamily="50" charset="-127"/>
+                </a:rPr>
+                <a:t>학생</a:t>
+              </a:r>
+              <a:r>
+                <a:rPr lang="en-US" altLang="ko-KR" dirty="0">
+                  <a:latin typeface="Microsoft GothicNeo" panose="020B0500000101010101" pitchFamily="50" charset="-127"/>
+                  <a:ea typeface="Microsoft GothicNeo" panose="020B0500000101010101" pitchFamily="50" charset="-127"/>
+                  <a:cs typeface="Microsoft GothicNeo" panose="020B0500000101010101" pitchFamily="50" charset="-127"/>
+                </a:rPr>
                 <a:t>(User)</a:t>
               </a:r>
               <a:endParaRPr lang="ko-KR" altLang="en-US" dirty="0">
@@ -3640,21 +4650,18 @@
             <a:avLst/>
           </a:prstGeom>
           <a:ln>
-            <a:solidFill>
-              <a:schemeClr val="tx1"/>
-            </a:solidFill>
             <a:tailEnd type="triangle"/>
           </a:ln>
         </p:spPr>
         <p:style>
           <a:lnRef idx="1">
-            <a:schemeClr val="accent1"/>
+            <a:schemeClr val="dk1"/>
           </a:lnRef>
           <a:fillRef idx="0">
-            <a:schemeClr val="accent1"/>
+            <a:schemeClr val="dk1"/>
           </a:fillRef>
           <a:effectRef idx="0">
-            <a:schemeClr val="accent1"/>
+            <a:schemeClr val="dk1"/>
           </a:effectRef>
           <a:fontRef idx="minor">
             <a:schemeClr val="tx1"/>
@@ -3715,14 +4722,20 @@
           <a:p>
             <a:pPr algn="ctr"/>
             <a:r>
-              <a:rPr lang="en-US" altLang="ko-KR" b="1" dirty="0">
+              <a:rPr lang="en-US" altLang="ko-KR" b="1" dirty="0" err="1">
                 <a:solidFill>
                   <a:schemeClr val="tx1"/>
                 </a:solidFill>
                 <a:effectLst/>
               </a:rPr>
-              <a:t>Add_User</a:t>
+              <a:t>AddUser</a:t>
             </a:r>
+            <a:endParaRPr lang="en-US" altLang="ko-KR" b="1" dirty="0">
+              <a:solidFill>
+                <a:schemeClr val="tx1"/>
+              </a:solidFill>
+              <a:effectLst/>
+            </a:endParaRPr>
           </a:p>
           <a:p>
             <a:pPr algn="ctr"/>
@@ -3767,21 +4780,18 @@
             <a:avLst/>
           </a:prstGeom>
           <a:ln>
-            <a:solidFill>
-              <a:schemeClr val="tx1"/>
-            </a:solidFill>
             <a:tailEnd type="triangle"/>
           </a:ln>
         </p:spPr>
         <p:style>
           <a:lnRef idx="1">
-            <a:schemeClr val="accent1"/>
+            <a:schemeClr val="dk1"/>
           </a:lnRef>
           <a:fillRef idx="0">
-            <a:schemeClr val="accent1"/>
+            <a:schemeClr val="dk1"/>
           </a:fillRef>
           <a:effectRef idx="0">
-            <a:schemeClr val="accent1"/>
+            <a:schemeClr val="dk1"/>
           </a:effectRef>
           <a:fontRef idx="minor">
             <a:schemeClr val="tx1"/>
@@ -4006,14 +5016,20 @@
           <a:p>
             <a:pPr algn="ctr"/>
             <a:r>
-              <a:rPr lang="en-US" altLang="ko-KR" b="1" dirty="0">
+              <a:rPr lang="en-US" altLang="ko-KR" b="1" dirty="0" err="1">
                 <a:solidFill>
                   <a:schemeClr val="tx1"/>
                 </a:solidFill>
                 <a:effectLst/>
               </a:rPr>
-              <a:t>Edit User</a:t>
+              <a:t>EditUser</a:t>
             </a:r>
+            <a:endParaRPr lang="en-US" altLang="ko-KR" b="1" dirty="0">
+              <a:solidFill>
+                <a:schemeClr val="tx1"/>
+              </a:solidFill>
+              <a:effectLst/>
+            </a:endParaRPr>
           </a:p>
           <a:p>
             <a:pPr algn="ctr"/>
@@ -4141,21 +5157,18 @@
             <a:avLst/>
           </a:prstGeom>
           <a:ln>
-            <a:solidFill>
-              <a:schemeClr val="tx1"/>
-            </a:solidFill>
             <a:tailEnd type="triangle"/>
           </a:ln>
         </p:spPr>
         <p:style>
           <a:lnRef idx="1">
-            <a:schemeClr val="accent1"/>
+            <a:schemeClr val="dk1"/>
           </a:lnRef>
           <a:fillRef idx="0">
-            <a:schemeClr val="accent1"/>
+            <a:schemeClr val="dk1"/>
           </a:fillRef>
           <a:effectRef idx="0">
-            <a:schemeClr val="accent1"/>
+            <a:schemeClr val="dk1"/>
           </a:effectRef>
           <a:fontRef idx="minor">
             <a:schemeClr val="tx1"/>
@@ -4187,21 +5200,18 @@
             <a:avLst/>
           </a:prstGeom>
           <a:ln>
-            <a:solidFill>
-              <a:schemeClr val="tx1"/>
-            </a:solidFill>
             <a:tailEnd type="triangle"/>
           </a:ln>
         </p:spPr>
         <p:style>
           <a:lnRef idx="1">
-            <a:schemeClr val="accent1"/>
+            <a:schemeClr val="dk1"/>
           </a:lnRef>
           <a:fillRef idx="0">
-            <a:schemeClr val="accent1"/>
+            <a:schemeClr val="dk1"/>
           </a:fillRef>
           <a:effectRef idx="0">
-            <a:schemeClr val="accent1"/>
+            <a:schemeClr val="dk1"/>
           </a:effectRef>
           <a:fontRef idx="minor">
             <a:schemeClr val="tx1"/>
@@ -4362,7 +5372,7 @@
         </p:nvSpPr>
         <p:spPr>
           <a:xfrm>
-            <a:off x="6885872" y="2706223"/>
+            <a:off x="6755233" y="2775446"/>
             <a:ext cx="1679917" cy="338554"/>
           </a:xfrm>
           <a:prstGeom prst="rect">
@@ -4656,6 +5666,855 @@
           </a:p>
         </p:txBody>
       </p:sp>
+      <p:cxnSp>
+        <p:nvCxnSpPr>
+          <p:cNvPr id="3" name="Straight Connector 2">
+            <a:extLst>
+              <a:ext uri="{FF2B5EF4-FFF2-40B4-BE49-F238E27FC236}">
+                <a16:creationId xmlns:a16="http://schemas.microsoft.com/office/drawing/2014/main" id="{4C67CCD4-0EAC-274A-954C-9BC92C652412}"/>
+              </a:ext>
+            </a:extLst>
+          </p:cNvPr>
+          <p:cNvCxnSpPr>
+            <a:cxnSpLocks/>
+            <a:stCxn id="15" idx="6"/>
+          </p:cNvCxnSpPr>
+          <p:nvPr/>
+        </p:nvCxnSpPr>
+        <p:spPr>
+          <a:xfrm flipV="1">
+            <a:off x="6286823" y="1692247"/>
+            <a:ext cx="4116335" cy="39839"/>
+          </a:xfrm>
+          <a:prstGeom prst="line">
+            <a:avLst/>
+          </a:prstGeom>
+        </p:spPr>
+        <p:style>
+          <a:lnRef idx="1">
+            <a:schemeClr val="dk1"/>
+          </a:lnRef>
+          <a:fillRef idx="0">
+            <a:schemeClr val="dk1"/>
+          </a:fillRef>
+          <a:effectRef idx="0">
+            <a:schemeClr val="dk1"/>
+          </a:effectRef>
+          <a:fontRef idx="minor">
+            <a:schemeClr val="tx1"/>
+          </a:fontRef>
+        </p:style>
+      </p:cxnSp>
+      <p:cxnSp>
+        <p:nvCxnSpPr>
+          <p:cNvPr id="29" name="Straight Connector 28">
+            <a:extLst>
+              <a:ext uri="{FF2B5EF4-FFF2-40B4-BE49-F238E27FC236}">
+                <a16:creationId xmlns:a16="http://schemas.microsoft.com/office/drawing/2014/main" id="{AFA0811C-9DC7-EE4E-8B78-2D8EB9634B81}"/>
+              </a:ext>
+            </a:extLst>
+          </p:cNvPr>
+          <p:cNvCxnSpPr>
+            <a:cxnSpLocks/>
+            <a:stCxn id="21" idx="6"/>
+            <a:endCxn id="45" idx="1"/>
+          </p:cNvCxnSpPr>
+          <p:nvPr/>
+        </p:nvCxnSpPr>
+        <p:spPr>
+          <a:xfrm flipV="1">
+            <a:off x="9430952" y="4261577"/>
+            <a:ext cx="936199" cy="66875"/>
+          </a:xfrm>
+          <a:prstGeom prst="line">
+            <a:avLst/>
+          </a:prstGeom>
+        </p:spPr>
+        <p:style>
+          <a:lnRef idx="1">
+            <a:schemeClr val="dk1"/>
+          </a:lnRef>
+          <a:fillRef idx="0">
+            <a:schemeClr val="dk1"/>
+          </a:fillRef>
+          <a:effectRef idx="0">
+            <a:schemeClr val="dk1"/>
+          </a:effectRef>
+          <a:fontRef idx="minor">
+            <a:schemeClr val="tx1"/>
+          </a:fontRef>
+        </p:style>
+      </p:cxnSp>
+      <p:grpSp>
+        <p:nvGrpSpPr>
+          <p:cNvPr id="34" name="그룹 11">
+            <a:extLst>
+              <a:ext uri="{FF2B5EF4-FFF2-40B4-BE49-F238E27FC236}">
+                <a16:creationId xmlns:a16="http://schemas.microsoft.com/office/drawing/2014/main" id="{71B79246-B127-3E48-9BF8-4B93DC754626}"/>
+              </a:ext>
+            </a:extLst>
+          </p:cNvPr>
+          <p:cNvGrpSpPr/>
+          <p:nvPr/>
+        </p:nvGrpSpPr>
+        <p:grpSpPr>
+          <a:xfrm>
+            <a:off x="10403158" y="1140780"/>
+            <a:ext cx="1492144" cy="1227938"/>
+            <a:chOff x="-146220" y="2331720"/>
+            <a:chExt cx="2650720" cy="2181371"/>
+          </a:xfrm>
+        </p:grpSpPr>
+        <p:pic>
+          <p:nvPicPr>
+            <p:cNvPr id="35" name="그래픽 4" descr="남자">
+              <a:extLst>
+                <a:ext uri="{FF2B5EF4-FFF2-40B4-BE49-F238E27FC236}">
+                  <a16:creationId xmlns:a16="http://schemas.microsoft.com/office/drawing/2014/main" id="{B4B71B0D-A3A2-5843-A364-42E8D616641D}"/>
+                </a:ext>
+              </a:extLst>
+            </p:cNvPr>
+            <p:cNvPicPr>
+              <a:picLocks noChangeAspect="1"/>
+            </p:cNvPicPr>
+            <p:nvPr/>
+          </p:nvPicPr>
+          <p:blipFill>
+            <a:blip r:embed="rId2">
+              <a:extLst>
+                <a:ext uri="{28A0092B-C50C-407E-A947-70E740481C1C}">
+                  <a14:useLocalDpi xmlns:a14="http://schemas.microsoft.com/office/drawing/2010/main" val="0"/>
+                </a:ext>
+                <a:ext uri="{96DAC541-7B7A-43D3-8B79-37D633B846F1}">
+                  <asvg:svgBlip xmlns:asvg="http://schemas.microsoft.com/office/drawing/2016/SVG/main" r:embed="rId3"/>
+                </a:ext>
+              </a:extLst>
+            </a:blip>
+            <a:stretch>
+              <a:fillRect/>
+            </a:stretch>
+          </p:blipFill>
+          <p:spPr>
+            <a:xfrm>
+              <a:off x="377483" y="2331720"/>
+              <a:ext cx="1409114" cy="1409114"/>
+            </a:xfrm>
+            <a:prstGeom prst="rect">
+              <a:avLst/>
+            </a:prstGeom>
+          </p:spPr>
+        </p:pic>
+        <p:sp>
+          <p:nvSpPr>
+            <p:cNvPr id="37" name="TextBox 36">
+              <a:extLst>
+                <a:ext uri="{FF2B5EF4-FFF2-40B4-BE49-F238E27FC236}">
+                  <a16:creationId xmlns:a16="http://schemas.microsoft.com/office/drawing/2014/main" id="{10C65A58-A275-9947-A51C-C1AEDCB329BA}"/>
+                </a:ext>
+              </a:extLst>
+            </p:cNvPr>
+            <p:cNvSpPr txBox="1"/>
+            <p:nvPr/>
+          </p:nvSpPr>
+          <p:spPr>
+            <a:xfrm>
+              <a:off x="-146220" y="3740834"/>
+              <a:ext cx="2650720" cy="772257"/>
+            </a:xfrm>
+            <a:prstGeom prst="rect">
+              <a:avLst/>
+            </a:prstGeom>
+            <a:noFill/>
+          </p:spPr>
+          <p:txBody>
+            <a:bodyPr wrap="square">
+              <a:spAutoFit/>
+            </a:bodyPr>
+            <a:lstStyle/>
+            <a:p>
+              <a:pPr algn="ctr"/>
+              <a:r>
+                <a:rPr lang="en-US" altLang="ko-KR" sz="1600" dirty="0">
+                  <a:latin typeface="Microsoft GothicNeo" panose="020B0500000101010101" pitchFamily="50" charset="-127"/>
+                  <a:ea typeface="Microsoft GothicNeo" panose="020B0500000101010101" pitchFamily="50" charset="-127"/>
+                  <a:cs typeface="Microsoft GothicNeo" panose="020B0500000101010101" pitchFamily="50" charset="-127"/>
+                </a:rPr>
+                <a:t>Verification</a:t>
+              </a:r>
+            </a:p>
+            <a:p>
+              <a:pPr algn="ctr"/>
+              <a:r>
+                <a:rPr lang="en-US" altLang="ko-KR" sz="1600" dirty="0">
+                  <a:latin typeface="Microsoft GothicNeo" panose="020B0500000101010101" pitchFamily="50" charset="-127"/>
+                  <a:ea typeface="Microsoft GothicNeo" panose="020B0500000101010101" pitchFamily="50" charset="-127"/>
+                  <a:cs typeface="Microsoft GothicNeo" panose="020B0500000101010101" pitchFamily="50" charset="-127"/>
+                </a:rPr>
+                <a:t>Service</a:t>
+              </a:r>
+              <a:endParaRPr lang="ko-KR" altLang="en-US" sz="1600" dirty="0">
+                <a:latin typeface="Microsoft GothicNeo" panose="020B0500000101010101" pitchFamily="50" charset="-127"/>
+                <a:ea typeface="Microsoft GothicNeo" panose="020B0500000101010101" pitchFamily="50" charset="-127"/>
+                <a:cs typeface="Microsoft GothicNeo" panose="020B0500000101010101" pitchFamily="50" charset="-127"/>
+              </a:endParaRPr>
+            </a:p>
+          </p:txBody>
+        </p:sp>
+      </p:grpSp>
+      <p:grpSp>
+        <p:nvGrpSpPr>
+          <p:cNvPr id="43" name="그룹 11">
+            <a:extLst>
+              <a:ext uri="{FF2B5EF4-FFF2-40B4-BE49-F238E27FC236}">
+                <a16:creationId xmlns:a16="http://schemas.microsoft.com/office/drawing/2014/main" id="{937A6CBE-C6F8-E64A-9406-3C21BCE55577}"/>
+              </a:ext>
+            </a:extLst>
+          </p:cNvPr>
+          <p:cNvGrpSpPr/>
+          <p:nvPr/>
+        </p:nvGrpSpPr>
+        <p:grpSpPr>
+          <a:xfrm>
+            <a:off x="10367151" y="3175970"/>
+            <a:ext cx="1603044" cy="1377994"/>
+            <a:chOff x="-146220" y="2331720"/>
+            <a:chExt cx="2847728" cy="2447938"/>
+          </a:xfrm>
+        </p:grpSpPr>
+        <p:pic>
+          <p:nvPicPr>
+            <p:cNvPr id="44" name="그래픽 4" descr="남자">
+              <a:extLst>
+                <a:ext uri="{FF2B5EF4-FFF2-40B4-BE49-F238E27FC236}">
+                  <a16:creationId xmlns:a16="http://schemas.microsoft.com/office/drawing/2014/main" id="{6D820334-097E-6A47-99EB-BFC79D003B3F}"/>
+                </a:ext>
+              </a:extLst>
+            </p:cNvPr>
+            <p:cNvPicPr>
+              <a:picLocks noChangeAspect="1"/>
+            </p:cNvPicPr>
+            <p:nvPr/>
+          </p:nvPicPr>
+          <p:blipFill>
+            <a:blip r:embed="rId2">
+              <a:extLst>
+                <a:ext uri="{28A0092B-C50C-407E-A947-70E740481C1C}">
+                  <a14:useLocalDpi xmlns:a14="http://schemas.microsoft.com/office/drawing/2010/main" val="0"/>
+                </a:ext>
+                <a:ext uri="{96DAC541-7B7A-43D3-8B79-37D633B846F1}">
+                  <asvg:svgBlip xmlns:asvg="http://schemas.microsoft.com/office/drawing/2016/SVG/main" r:embed="rId3"/>
+                </a:ext>
+              </a:extLst>
+            </a:blip>
+            <a:stretch>
+              <a:fillRect/>
+            </a:stretch>
+          </p:blipFill>
+          <p:spPr>
+            <a:xfrm>
+              <a:off x="377483" y="2331720"/>
+              <a:ext cx="1409114" cy="1409114"/>
+            </a:xfrm>
+            <a:prstGeom prst="rect">
+              <a:avLst/>
+            </a:prstGeom>
+          </p:spPr>
+        </p:pic>
+        <p:sp>
+          <p:nvSpPr>
+            <p:cNvPr id="45" name="TextBox 44">
+              <a:extLst>
+                <a:ext uri="{FF2B5EF4-FFF2-40B4-BE49-F238E27FC236}">
+                  <a16:creationId xmlns:a16="http://schemas.microsoft.com/office/drawing/2014/main" id="{CEA8D3F4-534B-4846-83CB-F4545B2676CE}"/>
+                </a:ext>
+              </a:extLst>
+            </p:cNvPr>
+            <p:cNvSpPr txBox="1"/>
+            <p:nvPr/>
+          </p:nvSpPr>
+          <p:spPr>
+            <a:xfrm>
+              <a:off x="-146220" y="3740834"/>
+              <a:ext cx="2847728" cy="1038824"/>
+            </a:xfrm>
+            <a:prstGeom prst="rect">
+              <a:avLst/>
+            </a:prstGeom>
+            <a:noFill/>
+          </p:spPr>
+          <p:txBody>
+            <a:bodyPr wrap="square">
+              <a:spAutoFit/>
+            </a:bodyPr>
+            <a:lstStyle/>
+            <a:p>
+              <a:pPr algn="ctr"/>
+              <a:r>
+                <a:rPr lang="en-US" altLang="ko-KR" sz="1600" dirty="0">
+                  <a:latin typeface="Microsoft GothicNeo" panose="020B0500000101010101" pitchFamily="50" charset="-127"/>
+                  <a:ea typeface="Microsoft GothicNeo" panose="020B0500000101010101" pitchFamily="50" charset="-127"/>
+                  <a:cs typeface="Microsoft GothicNeo" panose="020B0500000101010101" pitchFamily="50" charset="-127"/>
+                </a:rPr>
+                <a:t>Authentication</a:t>
+              </a:r>
+            </a:p>
+            <a:p>
+              <a:pPr algn="ctr"/>
+              <a:r>
+                <a:rPr lang="en-US" altLang="ko-KR" sz="1600" dirty="0">
+                  <a:latin typeface="Microsoft GothicNeo" panose="020B0500000101010101" pitchFamily="50" charset="-127"/>
+                  <a:ea typeface="Microsoft GothicNeo" panose="020B0500000101010101" pitchFamily="50" charset="-127"/>
+                  <a:cs typeface="Microsoft GothicNeo" panose="020B0500000101010101" pitchFamily="50" charset="-127"/>
+                </a:rPr>
+                <a:t>Service</a:t>
+              </a:r>
+              <a:endParaRPr lang="ko-KR" altLang="en-US" sz="1600" dirty="0">
+                <a:latin typeface="Microsoft GothicNeo" panose="020B0500000101010101" pitchFamily="50" charset="-127"/>
+                <a:ea typeface="Microsoft GothicNeo" panose="020B0500000101010101" pitchFamily="50" charset="-127"/>
+                <a:cs typeface="Microsoft GothicNeo" panose="020B0500000101010101" pitchFamily="50" charset="-127"/>
+              </a:endParaRPr>
+            </a:p>
+          </p:txBody>
+        </p:sp>
+      </p:grpSp>
+      <p:grpSp>
+        <p:nvGrpSpPr>
+          <p:cNvPr id="46" name="그룹 11">
+            <a:extLst>
+              <a:ext uri="{FF2B5EF4-FFF2-40B4-BE49-F238E27FC236}">
+                <a16:creationId xmlns:a16="http://schemas.microsoft.com/office/drawing/2014/main" id="{90F0B570-4F88-1849-A4EF-946B798D442F}"/>
+              </a:ext>
+            </a:extLst>
+          </p:cNvPr>
+          <p:cNvGrpSpPr/>
+          <p:nvPr/>
+        </p:nvGrpSpPr>
+        <p:grpSpPr>
+          <a:xfrm>
+            <a:off x="10568343" y="4966842"/>
+            <a:ext cx="980439" cy="1406033"/>
+            <a:chOff x="74870" y="2331720"/>
+            <a:chExt cx="1741702" cy="2497748"/>
+          </a:xfrm>
+        </p:grpSpPr>
+        <p:pic>
+          <p:nvPicPr>
+            <p:cNvPr id="49" name="그래픽 4" descr="남자">
+              <a:extLst>
+                <a:ext uri="{FF2B5EF4-FFF2-40B4-BE49-F238E27FC236}">
+                  <a16:creationId xmlns:a16="http://schemas.microsoft.com/office/drawing/2014/main" id="{F58FD870-6992-3C42-81A1-A148C1AE378A}"/>
+                </a:ext>
+              </a:extLst>
+            </p:cNvPr>
+            <p:cNvPicPr>
+              <a:picLocks noChangeAspect="1"/>
+            </p:cNvPicPr>
+            <p:nvPr/>
+          </p:nvPicPr>
+          <p:blipFill>
+            <a:blip r:embed="rId2">
+              <a:extLst>
+                <a:ext uri="{28A0092B-C50C-407E-A947-70E740481C1C}">
+                  <a14:useLocalDpi xmlns:a14="http://schemas.microsoft.com/office/drawing/2010/main" val="0"/>
+                </a:ext>
+                <a:ext uri="{96DAC541-7B7A-43D3-8B79-37D633B846F1}">
+                  <asvg:svgBlip xmlns:asvg="http://schemas.microsoft.com/office/drawing/2016/SVG/main" r:embed="rId3"/>
+                </a:ext>
+              </a:extLst>
+            </a:blip>
+            <a:stretch>
+              <a:fillRect/>
+            </a:stretch>
+          </p:blipFill>
+          <p:spPr>
+            <a:xfrm>
+              <a:off x="377483" y="2331720"/>
+              <a:ext cx="1409114" cy="1409114"/>
+            </a:xfrm>
+            <a:prstGeom prst="rect">
+              <a:avLst/>
+            </a:prstGeom>
+          </p:spPr>
+        </p:pic>
+        <p:sp>
+          <p:nvSpPr>
+            <p:cNvPr id="50" name="TextBox 49">
+              <a:extLst>
+                <a:ext uri="{FF2B5EF4-FFF2-40B4-BE49-F238E27FC236}">
+                  <a16:creationId xmlns:a16="http://schemas.microsoft.com/office/drawing/2014/main" id="{794617A6-7FB4-5740-82D4-A884DC89798B}"/>
+                </a:ext>
+              </a:extLst>
+            </p:cNvPr>
+            <p:cNvSpPr txBox="1"/>
+            <p:nvPr/>
+          </p:nvSpPr>
+          <p:spPr>
+            <a:xfrm>
+              <a:off x="74870" y="3790644"/>
+              <a:ext cx="1741702" cy="1038824"/>
+            </a:xfrm>
+            <a:prstGeom prst="rect">
+              <a:avLst/>
+            </a:prstGeom>
+            <a:noFill/>
+          </p:spPr>
+          <p:txBody>
+            <a:bodyPr wrap="square">
+              <a:spAutoFit/>
+            </a:bodyPr>
+            <a:lstStyle/>
+            <a:p>
+              <a:pPr algn="ctr"/>
+              <a:r>
+                <a:rPr lang="en-US" altLang="ko-KR" sz="1600" dirty="0">
+                  <a:latin typeface="Microsoft GothicNeo" panose="020B0500000101010101" pitchFamily="50" charset="-127"/>
+                  <a:ea typeface="Microsoft GothicNeo" panose="020B0500000101010101" pitchFamily="50" charset="-127"/>
+                  <a:cs typeface="Microsoft GothicNeo" panose="020B0500000101010101" pitchFamily="50" charset="-127"/>
+                </a:rPr>
+                <a:t>User</a:t>
+              </a:r>
+            </a:p>
+            <a:p>
+              <a:pPr algn="ctr"/>
+              <a:r>
+                <a:rPr lang="en-US" altLang="ko-KR" sz="1600" dirty="0">
+                  <a:latin typeface="Microsoft GothicNeo" panose="020B0500000101010101" pitchFamily="50" charset="-127"/>
+                  <a:ea typeface="Microsoft GothicNeo" panose="020B0500000101010101" pitchFamily="50" charset="-127"/>
+                  <a:cs typeface="Microsoft GothicNeo" panose="020B0500000101010101" pitchFamily="50" charset="-127"/>
+                </a:rPr>
+                <a:t>Service</a:t>
+              </a:r>
+              <a:endParaRPr lang="ko-KR" altLang="en-US" sz="1600" dirty="0">
+                <a:latin typeface="Microsoft GothicNeo" panose="020B0500000101010101" pitchFamily="50" charset="-127"/>
+                <a:ea typeface="Microsoft GothicNeo" panose="020B0500000101010101" pitchFamily="50" charset="-127"/>
+                <a:cs typeface="Microsoft GothicNeo" panose="020B0500000101010101" pitchFamily="50" charset="-127"/>
+              </a:endParaRPr>
+            </a:p>
+          </p:txBody>
+        </p:sp>
+      </p:grpSp>
+      <p:cxnSp>
+        <p:nvCxnSpPr>
+          <p:cNvPr id="51" name="Straight Connector 50">
+            <a:extLst>
+              <a:ext uri="{FF2B5EF4-FFF2-40B4-BE49-F238E27FC236}">
+                <a16:creationId xmlns:a16="http://schemas.microsoft.com/office/drawing/2014/main" id="{6CEEBBEE-4403-A84F-A1C2-560634B51FCF}"/>
+              </a:ext>
+            </a:extLst>
+          </p:cNvPr>
+          <p:cNvCxnSpPr>
+            <a:cxnSpLocks/>
+            <a:stCxn id="15" idx="6"/>
+            <a:endCxn id="45" idx="1"/>
+          </p:cNvCxnSpPr>
+          <p:nvPr/>
+        </p:nvCxnSpPr>
+        <p:spPr>
+          <a:xfrm>
+            <a:off x="6286823" y="1732086"/>
+            <a:ext cx="4080328" cy="2529491"/>
+          </a:xfrm>
+          <a:prstGeom prst="line">
+            <a:avLst/>
+          </a:prstGeom>
+        </p:spPr>
+        <p:style>
+          <a:lnRef idx="1">
+            <a:schemeClr val="dk1"/>
+          </a:lnRef>
+          <a:fillRef idx="0">
+            <a:schemeClr val="dk1"/>
+          </a:fillRef>
+          <a:effectRef idx="0">
+            <a:schemeClr val="dk1"/>
+          </a:effectRef>
+          <a:fontRef idx="minor">
+            <a:schemeClr val="tx1"/>
+          </a:fontRef>
+        </p:style>
+      </p:cxnSp>
+      <p:cxnSp>
+        <p:nvCxnSpPr>
+          <p:cNvPr id="52" name="Straight Connector 51">
+            <a:extLst>
+              <a:ext uri="{FF2B5EF4-FFF2-40B4-BE49-F238E27FC236}">
+                <a16:creationId xmlns:a16="http://schemas.microsoft.com/office/drawing/2014/main" id="{605B9921-C7B6-2A45-AD4A-D93752202EE9}"/>
+              </a:ext>
+            </a:extLst>
+          </p:cNvPr>
+          <p:cNvCxnSpPr>
+            <a:cxnSpLocks/>
+            <a:stCxn id="24" idx="6"/>
+            <a:endCxn id="50" idx="1"/>
+          </p:cNvCxnSpPr>
+          <p:nvPr/>
+        </p:nvCxnSpPr>
+        <p:spPr>
+          <a:xfrm>
+            <a:off x="6286823" y="5404630"/>
+            <a:ext cx="4281520" cy="675858"/>
+          </a:xfrm>
+          <a:prstGeom prst="line">
+            <a:avLst/>
+          </a:prstGeom>
+        </p:spPr>
+        <p:style>
+          <a:lnRef idx="1">
+            <a:schemeClr val="dk1"/>
+          </a:lnRef>
+          <a:fillRef idx="0">
+            <a:schemeClr val="dk1"/>
+          </a:fillRef>
+          <a:effectRef idx="0">
+            <a:schemeClr val="dk1"/>
+          </a:effectRef>
+          <a:fontRef idx="minor">
+            <a:schemeClr val="tx1"/>
+          </a:fontRef>
+        </p:style>
+      </p:cxnSp>
+      <p:cxnSp>
+        <p:nvCxnSpPr>
+          <p:cNvPr id="53" name="Straight Connector 52">
+            <a:extLst>
+              <a:ext uri="{FF2B5EF4-FFF2-40B4-BE49-F238E27FC236}">
+                <a16:creationId xmlns:a16="http://schemas.microsoft.com/office/drawing/2014/main" id="{83990157-2F3C-1342-A0F4-256F6461FBBD}"/>
+              </a:ext>
+            </a:extLst>
+          </p:cNvPr>
+          <p:cNvCxnSpPr>
+            <a:cxnSpLocks/>
+            <a:endCxn id="50" idx="1"/>
+          </p:cNvCxnSpPr>
+          <p:nvPr/>
+        </p:nvCxnSpPr>
+        <p:spPr>
+          <a:xfrm>
+            <a:off x="6330784" y="4349035"/>
+            <a:ext cx="4237559" cy="1731453"/>
+          </a:xfrm>
+          <a:prstGeom prst="line">
+            <a:avLst/>
+          </a:prstGeom>
+        </p:spPr>
+        <p:style>
+          <a:lnRef idx="1">
+            <a:schemeClr val="dk1"/>
+          </a:lnRef>
+          <a:fillRef idx="0">
+            <a:schemeClr val="dk1"/>
+          </a:fillRef>
+          <a:effectRef idx="0">
+            <a:schemeClr val="dk1"/>
+          </a:effectRef>
+          <a:fontRef idx="minor">
+            <a:schemeClr val="tx1"/>
+          </a:fontRef>
+        </p:style>
+      </p:cxnSp>
+      <p:sp>
+        <p:nvSpPr>
+          <p:cNvPr id="59" name="TextBox 58">
+            <a:extLst>
+              <a:ext uri="{FF2B5EF4-FFF2-40B4-BE49-F238E27FC236}">
+                <a16:creationId xmlns:a16="http://schemas.microsoft.com/office/drawing/2014/main" id="{3C1D68C8-C88D-1046-BF5B-9AF3031B932C}"/>
+              </a:ext>
+            </a:extLst>
+          </p:cNvPr>
+          <p:cNvSpPr txBox="1"/>
+          <p:nvPr/>
+        </p:nvSpPr>
+        <p:spPr>
+          <a:xfrm>
+            <a:off x="7775887" y="1365064"/>
+            <a:ext cx="1892192" cy="338554"/>
+          </a:xfrm>
+          <a:prstGeom prst="rect">
+            <a:avLst/>
+          </a:prstGeom>
+          <a:noFill/>
+        </p:spPr>
+        <p:txBody>
+          <a:bodyPr wrap="square">
+            <a:spAutoFit/>
+          </a:bodyPr>
+          <a:lstStyle/>
+          <a:p>
+            <a:r>
+              <a:rPr lang="en-US" altLang="ko-KR" sz="1600" dirty="0">
+                <a:latin typeface="Microsoft GothicNeo" panose="020B0500000101010101" pitchFamily="50" charset="-127"/>
+                <a:ea typeface="Microsoft GothicNeo" panose="020B0500000101010101" pitchFamily="50" charset="-127"/>
+                <a:cs typeface="Microsoft GothicNeo" panose="020B0500000101010101" pitchFamily="50" charset="-127"/>
+              </a:rPr>
+              <a:t>&lt;&lt;participate&gt;&gt;</a:t>
+            </a:r>
+            <a:endParaRPr lang="ko-KR" altLang="en-US" sz="1600" dirty="0">
+              <a:latin typeface="Microsoft GothicNeo" panose="020B0500000101010101" pitchFamily="50" charset="-127"/>
+              <a:ea typeface="Microsoft GothicNeo" panose="020B0500000101010101" pitchFamily="50" charset="-127"/>
+              <a:cs typeface="Microsoft GothicNeo" panose="020B0500000101010101" pitchFamily="50" charset="-127"/>
+            </a:endParaRPr>
+          </a:p>
+        </p:txBody>
+      </p:sp>
+      <p:sp>
+        <p:nvSpPr>
+          <p:cNvPr id="60" name="TextBox 59">
+            <a:extLst>
+              <a:ext uri="{FF2B5EF4-FFF2-40B4-BE49-F238E27FC236}">
+                <a16:creationId xmlns:a16="http://schemas.microsoft.com/office/drawing/2014/main" id="{E0EF00BA-17D8-6444-B947-011377CD4FE9}"/>
+              </a:ext>
+            </a:extLst>
+          </p:cNvPr>
+          <p:cNvSpPr txBox="1"/>
+          <p:nvPr/>
+        </p:nvSpPr>
+        <p:spPr>
+          <a:xfrm rot="980485">
+            <a:off x="7561141" y="3426150"/>
+            <a:ext cx="1892192" cy="307777"/>
+          </a:xfrm>
+          <a:prstGeom prst="rect">
+            <a:avLst/>
+          </a:prstGeom>
+          <a:noFill/>
+        </p:spPr>
+        <p:txBody>
+          <a:bodyPr wrap="square">
+            <a:spAutoFit/>
+          </a:bodyPr>
+          <a:lstStyle/>
+          <a:p>
+            <a:r>
+              <a:rPr lang="en-US" altLang="ko-KR" sz="1400" dirty="0">
+                <a:latin typeface="Microsoft GothicNeo" panose="020B0500000101010101" pitchFamily="50" charset="-127"/>
+                <a:ea typeface="Microsoft GothicNeo" panose="020B0500000101010101" pitchFamily="50" charset="-127"/>
+                <a:cs typeface="Microsoft GothicNeo" panose="020B0500000101010101" pitchFamily="50" charset="-127"/>
+              </a:rPr>
+              <a:t>&lt;&lt;participate&gt;&gt;</a:t>
+            </a:r>
+            <a:endParaRPr lang="ko-KR" altLang="en-US" sz="1400" dirty="0">
+              <a:latin typeface="Microsoft GothicNeo" panose="020B0500000101010101" pitchFamily="50" charset="-127"/>
+              <a:ea typeface="Microsoft GothicNeo" panose="020B0500000101010101" pitchFamily="50" charset="-127"/>
+              <a:cs typeface="Microsoft GothicNeo" panose="020B0500000101010101" pitchFamily="50" charset="-127"/>
+            </a:endParaRPr>
+          </a:p>
+        </p:txBody>
+      </p:sp>
+      <p:sp>
+        <p:nvSpPr>
+          <p:cNvPr id="61" name="TextBox 60">
+            <a:extLst>
+              <a:ext uri="{FF2B5EF4-FFF2-40B4-BE49-F238E27FC236}">
+                <a16:creationId xmlns:a16="http://schemas.microsoft.com/office/drawing/2014/main" id="{5500B4C0-684E-7545-AFE5-0D34A3666938}"/>
+              </a:ext>
+            </a:extLst>
+          </p:cNvPr>
+          <p:cNvSpPr txBox="1"/>
+          <p:nvPr/>
+        </p:nvSpPr>
+        <p:spPr>
+          <a:xfrm rot="21187814">
+            <a:off x="9271579" y="4255097"/>
+            <a:ext cx="1245234" cy="261610"/>
+          </a:xfrm>
+          <a:prstGeom prst="rect">
+            <a:avLst/>
+          </a:prstGeom>
+          <a:noFill/>
+        </p:spPr>
+        <p:txBody>
+          <a:bodyPr wrap="square">
+            <a:spAutoFit/>
+          </a:bodyPr>
+          <a:lstStyle/>
+          <a:p>
+            <a:r>
+              <a:rPr lang="en-US" altLang="ko-KR" sz="1100" dirty="0">
+                <a:latin typeface="Microsoft GothicNeo" panose="020B0500000101010101" pitchFamily="50" charset="-127"/>
+                <a:ea typeface="Microsoft GothicNeo" panose="020B0500000101010101" pitchFamily="50" charset="-127"/>
+                <a:cs typeface="Microsoft GothicNeo" panose="020B0500000101010101" pitchFamily="50" charset="-127"/>
+              </a:rPr>
+              <a:t>&lt;&lt;participate&gt;&gt;</a:t>
+            </a:r>
+            <a:endParaRPr lang="ko-KR" altLang="en-US" sz="1100" dirty="0">
+              <a:latin typeface="Microsoft GothicNeo" panose="020B0500000101010101" pitchFamily="50" charset="-127"/>
+              <a:ea typeface="Microsoft GothicNeo" panose="020B0500000101010101" pitchFamily="50" charset="-127"/>
+              <a:cs typeface="Microsoft GothicNeo" panose="020B0500000101010101" pitchFamily="50" charset="-127"/>
+            </a:endParaRPr>
+          </a:p>
+        </p:txBody>
+      </p:sp>
+      <p:sp>
+        <p:nvSpPr>
+          <p:cNvPr id="67" name="TextBox 66">
+            <a:extLst>
+              <a:ext uri="{FF2B5EF4-FFF2-40B4-BE49-F238E27FC236}">
+                <a16:creationId xmlns:a16="http://schemas.microsoft.com/office/drawing/2014/main" id="{6C9F6C9D-9466-DB47-BF24-B7063B49A6B2}"/>
+              </a:ext>
+            </a:extLst>
+          </p:cNvPr>
+          <p:cNvSpPr txBox="1"/>
+          <p:nvPr/>
+        </p:nvSpPr>
+        <p:spPr>
+          <a:xfrm rot="505655">
+            <a:off x="7920524" y="5548802"/>
+            <a:ext cx="1892192" cy="307777"/>
+          </a:xfrm>
+          <a:prstGeom prst="rect">
+            <a:avLst/>
+          </a:prstGeom>
+          <a:noFill/>
+        </p:spPr>
+        <p:txBody>
+          <a:bodyPr wrap="square">
+            <a:spAutoFit/>
+          </a:bodyPr>
+          <a:lstStyle/>
+          <a:p>
+            <a:r>
+              <a:rPr lang="en-US" altLang="ko-KR" sz="1400" dirty="0">
+                <a:latin typeface="Microsoft GothicNeo" panose="020B0500000101010101" pitchFamily="50" charset="-127"/>
+                <a:ea typeface="Microsoft GothicNeo" panose="020B0500000101010101" pitchFamily="50" charset="-127"/>
+                <a:cs typeface="Microsoft GothicNeo" panose="020B0500000101010101" pitchFamily="50" charset="-127"/>
+              </a:rPr>
+              <a:t>&lt;&lt;participate&gt;&gt;</a:t>
+            </a:r>
+            <a:endParaRPr lang="ko-KR" altLang="en-US" sz="1400" dirty="0">
+              <a:latin typeface="Microsoft GothicNeo" panose="020B0500000101010101" pitchFamily="50" charset="-127"/>
+              <a:ea typeface="Microsoft GothicNeo" panose="020B0500000101010101" pitchFamily="50" charset="-127"/>
+              <a:cs typeface="Microsoft GothicNeo" panose="020B0500000101010101" pitchFamily="50" charset="-127"/>
+            </a:endParaRPr>
+          </a:p>
+        </p:txBody>
+      </p:sp>
+      <p:sp>
+        <p:nvSpPr>
+          <p:cNvPr id="68" name="TextBox 67">
+            <a:extLst>
+              <a:ext uri="{FF2B5EF4-FFF2-40B4-BE49-F238E27FC236}">
+                <a16:creationId xmlns:a16="http://schemas.microsoft.com/office/drawing/2014/main" id="{DE426DB3-ABBF-F547-91D3-2928A07F4CEE}"/>
+              </a:ext>
+            </a:extLst>
+          </p:cNvPr>
+          <p:cNvSpPr txBox="1"/>
+          <p:nvPr/>
+        </p:nvSpPr>
+        <p:spPr>
+          <a:xfrm rot="1149868">
+            <a:off x="8537194" y="5345527"/>
+            <a:ext cx="1892192" cy="307777"/>
+          </a:xfrm>
+          <a:prstGeom prst="rect">
+            <a:avLst/>
+          </a:prstGeom>
+          <a:noFill/>
+        </p:spPr>
+        <p:txBody>
+          <a:bodyPr wrap="square">
+            <a:spAutoFit/>
+          </a:bodyPr>
+          <a:lstStyle/>
+          <a:p>
+            <a:r>
+              <a:rPr lang="en-US" altLang="ko-KR" sz="1400" dirty="0">
+                <a:latin typeface="Microsoft GothicNeo" panose="020B0500000101010101" pitchFamily="50" charset="-127"/>
+                <a:ea typeface="Microsoft GothicNeo" panose="020B0500000101010101" pitchFamily="50" charset="-127"/>
+                <a:cs typeface="Microsoft GothicNeo" panose="020B0500000101010101" pitchFamily="50" charset="-127"/>
+              </a:rPr>
+              <a:t>&lt;&lt;participate&gt;&gt;</a:t>
+            </a:r>
+            <a:endParaRPr lang="ko-KR" altLang="en-US" sz="1400" dirty="0">
+              <a:latin typeface="Microsoft GothicNeo" panose="020B0500000101010101" pitchFamily="50" charset="-127"/>
+              <a:ea typeface="Microsoft GothicNeo" panose="020B0500000101010101" pitchFamily="50" charset="-127"/>
+              <a:cs typeface="Microsoft GothicNeo" panose="020B0500000101010101" pitchFamily="50" charset="-127"/>
+            </a:endParaRPr>
+          </a:p>
+        </p:txBody>
+      </p:sp>
+      <p:cxnSp>
+        <p:nvCxnSpPr>
+          <p:cNvPr id="74" name="Straight Connector 73">
+            <a:extLst>
+              <a:ext uri="{FF2B5EF4-FFF2-40B4-BE49-F238E27FC236}">
+                <a16:creationId xmlns:a16="http://schemas.microsoft.com/office/drawing/2014/main" id="{132331AC-C18C-F441-B8BD-2CF1B5C6E9D7}"/>
+              </a:ext>
+            </a:extLst>
+          </p:cNvPr>
+          <p:cNvCxnSpPr>
+            <a:cxnSpLocks/>
+            <a:stCxn id="22" idx="6"/>
+          </p:cNvCxnSpPr>
+          <p:nvPr/>
+        </p:nvCxnSpPr>
+        <p:spPr>
+          <a:xfrm>
+            <a:off x="6330784" y="3087857"/>
+            <a:ext cx="4000881" cy="1175865"/>
+          </a:xfrm>
+          <a:prstGeom prst="line">
+            <a:avLst/>
+          </a:prstGeom>
+        </p:spPr>
+        <p:style>
+          <a:lnRef idx="1">
+            <a:schemeClr val="dk1"/>
+          </a:lnRef>
+          <a:fillRef idx="0">
+            <a:schemeClr val="dk1"/>
+          </a:fillRef>
+          <a:effectRef idx="0">
+            <a:schemeClr val="dk1"/>
+          </a:effectRef>
+          <a:fontRef idx="minor">
+            <a:schemeClr val="tx1"/>
+          </a:fontRef>
+        </p:style>
+      </p:cxnSp>
+      <p:sp>
+        <p:nvSpPr>
+          <p:cNvPr id="77" name="TextBox 76">
+            <a:extLst>
+              <a:ext uri="{FF2B5EF4-FFF2-40B4-BE49-F238E27FC236}">
+                <a16:creationId xmlns:a16="http://schemas.microsoft.com/office/drawing/2014/main" id="{C8846A4E-D5F7-D04F-BACB-E4132CC51948}"/>
+              </a:ext>
+            </a:extLst>
+          </p:cNvPr>
+          <p:cNvSpPr txBox="1"/>
+          <p:nvPr/>
+        </p:nvSpPr>
+        <p:spPr>
+          <a:xfrm rot="1873102">
+            <a:off x="8537194" y="3474394"/>
+            <a:ext cx="1892192" cy="307777"/>
+          </a:xfrm>
+          <a:prstGeom prst="rect">
+            <a:avLst/>
+          </a:prstGeom>
+          <a:noFill/>
+        </p:spPr>
+        <p:txBody>
+          <a:bodyPr wrap="square">
+            <a:spAutoFit/>
+          </a:bodyPr>
+          <a:lstStyle/>
+          <a:p>
+            <a:r>
+              <a:rPr lang="en-US" altLang="ko-KR" sz="1400" dirty="0">
+                <a:latin typeface="Microsoft GothicNeo" panose="020B0500000101010101" pitchFamily="50" charset="-127"/>
+                <a:ea typeface="Microsoft GothicNeo" panose="020B0500000101010101" pitchFamily="50" charset="-127"/>
+                <a:cs typeface="Microsoft GothicNeo" panose="020B0500000101010101" pitchFamily="50" charset="-127"/>
+              </a:rPr>
+              <a:t>&lt;&lt;participate&gt;&gt;</a:t>
+            </a:r>
+            <a:endParaRPr lang="ko-KR" altLang="en-US" sz="1400" dirty="0">
+              <a:latin typeface="Microsoft GothicNeo" panose="020B0500000101010101" pitchFamily="50" charset="-127"/>
+              <a:ea typeface="Microsoft GothicNeo" panose="020B0500000101010101" pitchFamily="50" charset="-127"/>
+              <a:cs typeface="Microsoft GothicNeo" panose="020B0500000101010101" pitchFamily="50" charset="-127"/>
+            </a:endParaRPr>
+          </a:p>
+        </p:txBody>
+      </p:sp>
     </p:spTree>
     <p:extLst>
       <p:ext uri="{BB962C8B-B14F-4D97-AF65-F5344CB8AC3E}">
@@ -4669,7 +6528,7 @@
 </p:sld>
 </file>
 
-<file path=ppt/slides/slide3.xml><?xml version="1.0" encoding="utf-8"?>
+<file path=ppt/slides/slide4.xml><?xml version="1.0" encoding="utf-8"?>
 <p:sld xmlns:a="http://schemas.openxmlformats.org/drawingml/2006/main" xmlns:r="http://schemas.openxmlformats.org/officeDocument/2006/relationships" xmlns:p="http://schemas.openxmlformats.org/presentationml/2006/main">
   <p:cSld>
     <p:spTree>
@@ -7160,7 +9019,7 @@
 </p:sld>
 </file>
 
-<file path=ppt/slides/slide4.xml><?xml version="1.0" encoding="utf-8"?>
+<file path=ppt/slides/slide5.xml><?xml version="1.0" encoding="utf-8"?>
 <p:sld xmlns:a="http://schemas.openxmlformats.org/drawingml/2006/main" xmlns:r="http://schemas.openxmlformats.org/officeDocument/2006/relationships" xmlns:p="http://schemas.openxmlformats.org/presentationml/2006/main">
   <p:cSld>
     <p:spTree>
@@ -9653,7 +11512,7 @@
 </p:sld>
 </file>
 
-<file path=ppt/slides/slide5.xml><?xml version="1.0" encoding="utf-8"?>
+<file path=ppt/slides/slide6.xml><?xml version="1.0" encoding="utf-8"?>
 <p:sld xmlns:a="http://schemas.openxmlformats.org/drawingml/2006/main" xmlns:r="http://schemas.openxmlformats.org/officeDocument/2006/relationships" xmlns:p="http://schemas.openxmlformats.org/presentationml/2006/main">
   <p:cSld>
     <p:spTree>
@@ -11756,7 +13615,7 @@
 </p:sld>
 </file>
 
-<file path=ppt/slides/slide6.xml><?xml version="1.0" encoding="utf-8"?>
+<file path=ppt/slides/slide7.xml><?xml version="1.0" encoding="utf-8"?>
 <p:sld xmlns:a="http://schemas.openxmlformats.org/drawingml/2006/main" xmlns:r="http://schemas.openxmlformats.org/officeDocument/2006/relationships" xmlns:p="http://schemas.openxmlformats.org/presentationml/2006/main">
   <p:cSld>
     <p:spTree>
@@ -14577,7 +16436,7 @@
 </p:sld>
 </file>
 
-<file path=ppt/slides/slide7.xml><?xml version="1.0" encoding="utf-8"?>
+<file path=ppt/slides/slide8.xml><?xml version="1.0" encoding="utf-8"?>
 <p:sld xmlns:a="http://schemas.openxmlformats.org/drawingml/2006/main" xmlns:r="http://schemas.openxmlformats.org/officeDocument/2006/relationships" xmlns:p="http://schemas.openxmlformats.org/presentationml/2006/main">
   <p:cSld>
     <p:spTree>

</xml_diff>

<commit_message>
Fix diagram participating services Fix use case schema
</commit_message>
<xml_diff>
--- a/Core/diagram.pptx
+++ b/Core/diagram.pptx
@@ -4191,186 +4191,6 @@
           </a:p>
         </p:txBody>
       </p:sp>
-      <p:sp>
-        <p:nvSpPr>
-          <p:cNvPr id="66" name="타원 21">
-            <a:extLst>
-              <a:ext uri="{FF2B5EF4-FFF2-40B4-BE49-F238E27FC236}">
-                <a16:creationId xmlns:a16="http://schemas.microsoft.com/office/drawing/2014/main" id="{6FF77B1A-2FD5-F74B-9D85-F4498558A2BA}"/>
-              </a:ext>
-            </a:extLst>
-          </p:cNvPr>
-          <p:cNvSpPr/>
-          <p:nvPr/>
-        </p:nvSpPr>
-        <p:spPr>
-          <a:xfrm>
-            <a:off x="4169524" y="4843474"/>
-            <a:ext cx="2592194" cy="861646"/>
-          </a:xfrm>
-          <a:prstGeom prst="ellipse">
-            <a:avLst/>
-          </a:prstGeom>
-          <a:solidFill>
-            <a:schemeClr val="tx2">
-              <a:lumMod val="40000"/>
-              <a:lumOff val="60000"/>
-            </a:schemeClr>
-          </a:solidFill>
-          <a:ln>
-            <a:solidFill>
-              <a:schemeClr val="tx1"/>
-            </a:solidFill>
-          </a:ln>
-        </p:spPr>
-        <p:style>
-          <a:lnRef idx="2">
-            <a:schemeClr val="accent1">
-              <a:shade val="50000"/>
-            </a:schemeClr>
-          </a:lnRef>
-          <a:fillRef idx="1">
-            <a:schemeClr val="accent1"/>
-          </a:fillRef>
-          <a:effectRef idx="0">
-            <a:schemeClr val="accent1"/>
-          </a:effectRef>
-          <a:fontRef idx="minor">
-            <a:schemeClr val="lt1"/>
-          </a:fontRef>
-        </p:style>
-        <p:txBody>
-          <a:bodyPr rtlCol="0" anchor="ctr"/>
-          <a:lstStyle/>
-          <a:p>
-            <a:pPr algn="ctr"/>
-            <a:r>
-              <a:rPr lang="en-US" altLang="ko-KR" b="1" dirty="0">
-                <a:solidFill>
-                  <a:schemeClr val="tx1"/>
-                </a:solidFill>
-              </a:rPr>
-              <a:t>Every Other Use Case</a:t>
-            </a:r>
-            <a:endParaRPr lang="en-US" altLang="ko-KR" b="1" dirty="0">
-              <a:solidFill>
-                <a:schemeClr val="tx1"/>
-              </a:solidFill>
-              <a:effectLst/>
-            </a:endParaRPr>
-          </a:p>
-          <a:p>
-            <a:pPr algn="ctr"/>
-            <a:r>
-              <a:rPr lang="en-US" altLang="ko-KR" b="1" dirty="0">
-                <a:solidFill>
-                  <a:schemeClr val="tx1"/>
-                </a:solidFill>
-                <a:effectLst/>
-              </a:rPr>
-              <a:t>(UC-XX)</a:t>
-            </a:r>
-            <a:endParaRPr lang="ko-KR" altLang="en-US" b="1" dirty="0">
-              <a:solidFill>
-                <a:schemeClr val="tx1"/>
-              </a:solidFill>
-            </a:endParaRPr>
-          </a:p>
-        </p:txBody>
-      </p:sp>
-      <p:cxnSp>
-        <p:nvCxnSpPr>
-          <p:cNvPr id="69" name="직선 화살표 연결선 30">
-            <a:extLst>
-              <a:ext uri="{FF2B5EF4-FFF2-40B4-BE49-F238E27FC236}">
-                <a16:creationId xmlns:a16="http://schemas.microsoft.com/office/drawing/2014/main" id="{64191EB2-6293-BC4E-8956-BE0AB0855E49}"/>
-              </a:ext>
-            </a:extLst>
-          </p:cNvPr>
-          <p:cNvCxnSpPr>
-            <a:cxnSpLocks/>
-            <a:stCxn id="66" idx="0"/>
-            <a:endCxn id="22" idx="4"/>
-          </p:cNvCxnSpPr>
-          <p:nvPr/>
-        </p:nvCxnSpPr>
-        <p:spPr>
-          <a:xfrm rot="5400000" flipH="1" flipV="1">
-            <a:off x="4803224" y="4181077"/>
-            <a:ext cx="1324794" cy="12700"/>
-          </a:xfrm>
-          <a:prstGeom prst="bentConnector3">
-            <a:avLst>
-              <a:gd name="adj1" fmla="val 50000"/>
-            </a:avLst>
-          </a:prstGeom>
-          <a:ln w="19050">
-            <a:solidFill>
-              <a:schemeClr val="tx1"/>
-            </a:solidFill>
-            <a:prstDash val="dash"/>
-            <a:tailEnd type="triangle"/>
-          </a:ln>
-        </p:spPr>
-        <p:style>
-          <a:lnRef idx="1">
-            <a:schemeClr val="accent1"/>
-          </a:lnRef>
-          <a:fillRef idx="0">
-            <a:schemeClr val="accent1"/>
-          </a:fillRef>
-          <a:effectRef idx="0">
-            <a:schemeClr val="accent1"/>
-          </a:effectRef>
-          <a:fontRef idx="minor">
-            <a:schemeClr val="tx1"/>
-          </a:fontRef>
-        </p:style>
-      </p:cxnSp>
-      <p:sp>
-        <p:nvSpPr>
-          <p:cNvPr id="70" name="TextBox 69">
-            <a:extLst>
-              <a:ext uri="{FF2B5EF4-FFF2-40B4-BE49-F238E27FC236}">
-                <a16:creationId xmlns:a16="http://schemas.microsoft.com/office/drawing/2014/main" id="{20ACE4C4-2DA2-574A-8F49-691E65709C32}"/>
-              </a:ext>
-            </a:extLst>
-          </p:cNvPr>
-          <p:cNvSpPr txBox="1"/>
-          <p:nvPr/>
-        </p:nvSpPr>
-        <p:spPr>
-          <a:xfrm rot="16200000">
-            <a:off x="4644416" y="3959019"/>
-            <a:ext cx="1337038" cy="276999"/>
-          </a:xfrm>
-          <a:prstGeom prst="rect">
-            <a:avLst/>
-          </a:prstGeom>
-          <a:noFill/>
-        </p:spPr>
-        <p:txBody>
-          <a:bodyPr wrap="square">
-            <a:spAutoFit/>
-          </a:bodyPr>
-          <a:lstStyle/>
-          <a:p>
-            <a:r>
-              <a:rPr lang="en-US" altLang="ko-KR" sz="1200" dirty="0">
-                <a:latin typeface="Microsoft GothicNeo" panose="020B0500000101010101" pitchFamily="50" charset="-127"/>
-                <a:ea typeface="Microsoft GothicNeo" panose="020B0500000101010101" pitchFamily="50" charset="-127"/>
-                <a:cs typeface="Microsoft GothicNeo" panose="020B0500000101010101" pitchFamily="50" charset="-127"/>
-              </a:rPr>
-              <a:t>&lt;&lt;include&gt;&gt;</a:t>
-            </a:r>
-            <a:endParaRPr lang="ko-KR" altLang="en-US" sz="1200" dirty="0">
-              <a:latin typeface="Microsoft GothicNeo" panose="020B0500000101010101" pitchFamily="50" charset="-127"/>
-              <a:ea typeface="Microsoft GothicNeo" panose="020B0500000101010101" pitchFamily="50" charset="-127"/>
-              <a:cs typeface="Microsoft GothicNeo" panose="020B0500000101010101" pitchFamily="50" charset="-127"/>
-            </a:endParaRPr>
-          </a:p>
-        </p:txBody>
-      </p:sp>
     </p:spTree>
     <p:extLst>
       <p:ext uri="{BB962C8B-B14F-4D97-AF65-F5344CB8AC3E}">
@@ -5016,20 +4836,29 @@
           <a:p>
             <a:pPr algn="ctr"/>
             <a:r>
-              <a:rPr lang="en-US" altLang="ko-KR" b="1" dirty="0" err="1">
+              <a:rPr lang="en-US" altLang="ko-KR" b="1" dirty="0">
+                <a:solidFill>
+                  <a:schemeClr val="tx1"/>
+                </a:solidFill>
+              </a:rPr>
+              <a:t>Modify</a:t>
+            </a:r>
+            <a:br>
+              <a:rPr lang="en-US" altLang="ko-KR" b="1" dirty="0">
+                <a:solidFill>
+                  <a:schemeClr val="tx1"/>
+                </a:solidFill>
+              </a:rPr>
+            </a:br>
+            <a:r>
+              <a:rPr lang="en-US" altLang="ko-KR" b="1" dirty="0">
                 <a:solidFill>
                   <a:schemeClr val="tx1"/>
                 </a:solidFill>
                 <a:effectLst/>
               </a:rPr>
-              <a:t>EditUser</a:t>
+              <a:t>User</a:t>
             </a:r>
-            <a:endParaRPr lang="en-US" altLang="ko-KR" b="1" dirty="0">
-              <a:solidFill>
-                <a:schemeClr val="tx1"/>
-              </a:solidFill>
-              <a:effectLst/>
-            </a:endParaRPr>
           </a:p>
           <a:p>
             <a:pPr algn="ctr"/>
@@ -6095,46 +5924,6 @@
       </p:grpSp>
       <p:cxnSp>
         <p:nvCxnSpPr>
-          <p:cNvPr id="51" name="Straight Connector 50">
-            <a:extLst>
-              <a:ext uri="{FF2B5EF4-FFF2-40B4-BE49-F238E27FC236}">
-                <a16:creationId xmlns:a16="http://schemas.microsoft.com/office/drawing/2014/main" id="{6CEEBBEE-4403-A84F-A1C2-560634B51FCF}"/>
-              </a:ext>
-            </a:extLst>
-          </p:cNvPr>
-          <p:cNvCxnSpPr>
-            <a:cxnSpLocks/>
-            <a:stCxn id="15" idx="6"/>
-            <a:endCxn id="45" idx="1"/>
-          </p:cNvCxnSpPr>
-          <p:nvPr/>
-        </p:nvCxnSpPr>
-        <p:spPr>
-          <a:xfrm>
-            <a:off x="6286823" y="1732086"/>
-            <a:ext cx="4080328" cy="2529491"/>
-          </a:xfrm>
-          <a:prstGeom prst="line">
-            <a:avLst/>
-          </a:prstGeom>
-        </p:spPr>
-        <p:style>
-          <a:lnRef idx="1">
-            <a:schemeClr val="dk1"/>
-          </a:lnRef>
-          <a:fillRef idx="0">
-            <a:schemeClr val="dk1"/>
-          </a:fillRef>
-          <a:effectRef idx="0">
-            <a:schemeClr val="dk1"/>
-          </a:effectRef>
-          <a:fontRef idx="minor">
-            <a:schemeClr val="tx1"/>
-          </a:fontRef>
-        </p:style>
-      </p:cxnSp>
-      <p:cxnSp>
-        <p:nvCxnSpPr>
           <p:cNvPr id="52" name="Straight Connector 51">
             <a:extLst>
               <a:ext uri="{FF2B5EF4-FFF2-40B4-BE49-F238E27FC236}">
@@ -6471,12 +6260,52 @@
           </a:fontRef>
         </p:style>
       </p:cxnSp>
+      <p:cxnSp>
+        <p:nvCxnSpPr>
+          <p:cNvPr id="84" name="Straight Connector 83">
+            <a:extLst>
+              <a:ext uri="{FF2B5EF4-FFF2-40B4-BE49-F238E27FC236}">
+                <a16:creationId xmlns:a16="http://schemas.microsoft.com/office/drawing/2014/main" id="{3C52BDBF-F250-874B-ADC0-3202E03CE770}"/>
+              </a:ext>
+            </a:extLst>
+          </p:cNvPr>
+          <p:cNvCxnSpPr>
+            <a:cxnSpLocks/>
+            <a:stCxn id="15" idx="6"/>
+            <a:endCxn id="50" idx="1"/>
+          </p:cNvCxnSpPr>
+          <p:nvPr/>
+        </p:nvCxnSpPr>
+        <p:spPr>
+          <a:xfrm>
+            <a:off x="6286823" y="1732086"/>
+            <a:ext cx="4281520" cy="4348402"/>
+          </a:xfrm>
+          <a:prstGeom prst="line">
+            <a:avLst/>
+          </a:prstGeom>
+        </p:spPr>
+        <p:style>
+          <a:lnRef idx="1">
+            <a:schemeClr val="dk1"/>
+          </a:lnRef>
+          <a:fillRef idx="0">
+            <a:schemeClr val="dk1"/>
+          </a:fillRef>
+          <a:effectRef idx="0">
+            <a:schemeClr val="dk1"/>
+          </a:effectRef>
+          <a:fontRef idx="minor">
+            <a:schemeClr val="tx1"/>
+          </a:fontRef>
+        </p:style>
+      </p:cxnSp>
       <p:sp>
         <p:nvSpPr>
-          <p:cNvPr id="77" name="TextBox 76">
-            <a:extLst>
-              <a:ext uri="{FF2B5EF4-FFF2-40B4-BE49-F238E27FC236}">
-                <a16:creationId xmlns:a16="http://schemas.microsoft.com/office/drawing/2014/main" id="{C8846A4E-D5F7-D04F-BACB-E4132CC51948}"/>
+          <p:cNvPr id="87" name="TextBox 86">
+            <a:extLst>
+              <a:ext uri="{FF2B5EF4-FFF2-40B4-BE49-F238E27FC236}">
+                <a16:creationId xmlns:a16="http://schemas.microsoft.com/office/drawing/2014/main" id="{A47E42F3-C9D4-F845-94A5-FD8453EBE8AD}"/>
               </a:ext>
             </a:extLst>
           </p:cNvPr>
@@ -6484,8 +6313,8 @@
           <p:nvPr/>
         </p:nvSpPr>
         <p:spPr>
-          <a:xfrm rot="1873102">
-            <a:off x="8537194" y="3474394"/>
+          <a:xfrm rot="2817805">
+            <a:off x="9007128" y="5141384"/>
             <a:ext cx="1892192" cy="307777"/>
           </a:xfrm>
           <a:prstGeom prst="rect">

</xml_diff>